<commit_message>
Added a check for a network connection to the add via camera button.
</commit_message>
<xml_diff>
--- a/src/docs/Presentation/Got Movie Presentation.pptx
+++ b/src/docs/Presentation/Got Movie Presentation.pptx
@@ -1048,6 +1048,98 @@
 </p:notes>
 </file>
 
+<file path=ppt/notesSlides/notesSlide6.xml><?xml version="1.0" encoding="utf-8"?>
+<p:notes xmlns:a="http://schemas.openxmlformats.org/drawingml/2006/main" xmlns:r="http://schemas.openxmlformats.org/officeDocument/2006/relationships" xmlns:p="http://schemas.openxmlformats.org/presentationml/2006/main">
+  <p:cSld>
+    <p:spTree>
+      <p:nvGrpSpPr>
+        <p:cNvPr id="1" name=""/>
+        <p:cNvGrpSpPr/>
+        <p:nvPr/>
+      </p:nvGrpSpPr>
+      <p:grpSpPr>
+        <a:xfrm>
+          <a:off x="0" y="0"/>
+          <a:ext cx="0" cy="0"/>
+          <a:chOff x="0" y="0"/>
+          <a:chExt cx="0" cy="0"/>
+        </a:xfrm>
+      </p:grpSpPr>
+      <p:sp>
+        <p:nvSpPr>
+          <p:cNvPr id="2" name="Slide Image Placeholder 1"/>
+          <p:cNvSpPr>
+            <a:spLocks noGrp="1" noRot="1" noChangeAspect="1"/>
+          </p:cNvSpPr>
+          <p:nvPr>
+            <p:ph type="sldImg"/>
+          </p:nvPr>
+        </p:nvSpPr>
+        <p:spPr/>
+      </p:sp>
+      <p:sp>
+        <p:nvSpPr>
+          <p:cNvPr id="3" name="Notes Placeholder 2"/>
+          <p:cNvSpPr>
+            <a:spLocks noGrp="1"/>
+          </p:cNvSpPr>
+          <p:nvPr>
+            <p:ph type="body" idx="1"/>
+          </p:nvPr>
+        </p:nvSpPr>
+        <p:spPr/>
+        <p:txBody>
+          <a:bodyPr/>
+          <a:lstStyle/>
+          <a:p>
+            <a:r>
+              <a:rPr lang="en-US" dirty="0" smtClean="0"/>
+              <a:t>Modified uses distance to find the valley instead of foreground/background </a:t>
+            </a:r>
+            <a:r>
+              <a:rPr lang="en-US" smtClean="0"/>
+              <a:t>weight values.</a:t>
+            </a:r>
+            <a:endParaRPr lang="en-US"/>
+          </a:p>
+        </p:txBody>
+      </p:sp>
+      <p:sp>
+        <p:nvSpPr>
+          <p:cNvPr id="4" name="Slide Number Placeholder 3"/>
+          <p:cNvSpPr>
+            <a:spLocks noGrp="1"/>
+          </p:cNvSpPr>
+          <p:nvPr>
+            <p:ph type="sldNum" sz="quarter" idx="10"/>
+          </p:nvPr>
+        </p:nvSpPr>
+        <p:spPr/>
+        <p:txBody>
+          <a:bodyPr/>
+          <a:lstStyle/>
+          <a:p>
+            <a:fld id="{E6D7A5A8-F93E-4C3E-AD80-07D1A2695B6B}" type="slidenum">
+              <a:rPr lang="en-US" smtClean="0"/>
+              <a:t>16</a:t>
+            </a:fld>
+            <a:endParaRPr lang="en-US"/>
+          </a:p>
+        </p:txBody>
+      </p:sp>
+    </p:spTree>
+    <p:extLst>
+      <p:ext uri="{BB962C8B-B14F-4D97-AF65-F5344CB8AC3E}">
+        <p14:creationId xmlns:p14="http://schemas.microsoft.com/office/powerpoint/2010/main" val="3104194775"/>
+      </p:ext>
+    </p:extLst>
+  </p:cSld>
+  <p:clrMapOvr>
+    <a:masterClrMapping/>
+  </p:clrMapOvr>
+</p:notes>
+</file>
+
 <file path=ppt/slideLayouts/slideLayout1.xml><?xml version="1.0" encoding="utf-8"?>
 <p:sldLayout xmlns:a="http://schemas.openxmlformats.org/drawingml/2006/main" xmlns:r="http://schemas.openxmlformats.org/officeDocument/2006/relationships" xmlns:p="http://schemas.openxmlformats.org/presentationml/2006/main" type="title" preserve="1">
   <p:cSld name="Title Slide">
@@ -1229,7 +1321,7 @@
           <a:p>
             <a:fld id="{C77C966F-52A3-4FA9-9BCB-12A0FAAAB3FF}" type="datetimeFigureOut">
               <a:rPr lang="en-US" smtClean="0"/>
-              <a:t>4/21/2012</a:t>
+              <a:t>4/22/2012</a:t>
             </a:fld>
             <a:endParaRPr lang="en-US"/>
           </a:p>
@@ -1399,7 +1491,7 @@
           <a:p>
             <a:fld id="{C77C966F-52A3-4FA9-9BCB-12A0FAAAB3FF}" type="datetimeFigureOut">
               <a:rPr lang="en-US" smtClean="0"/>
-              <a:t>4/21/2012</a:t>
+              <a:t>4/22/2012</a:t>
             </a:fld>
             <a:endParaRPr lang="en-US"/>
           </a:p>
@@ -1579,7 +1671,7 @@
           <a:p>
             <a:fld id="{C77C966F-52A3-4FA9-9BCB-12A0FAAAB3FF}" type="datetimeFigureOut">
               <a:rPr lang="en-US" smtClean="0"/>
-              <a:t>4/21/2012</a:t>
+              <a:t>4/22/2012</a:t>
             </a:fld>
             <a:endParaRPr lang="en-US"/>
           </a:p>
@@ -1749,7 +1841,7 @@
           <a:p>
             <a:fld id="{C77C966F-52A3-4FA9-9BCB-12A0FAAAB3FF}" type="datetimeFigureOut">
               <a:rPr lang="en-US" smtClean="0"/>
-              <a:t>4/21/2012</a:t>
+              <a:t>4/22/2012</a:t>
             </a:fld>
             <a:endParaRPr lang="en-US"/>
           </a:p>
@@ -1995,7 +2087,7 @@
           <a:p>
             <a:fld id="{C77C966F-52A3-4FA9-9BCB-12A0FAAAB3FF}" type="datetimeFigureOut">
               <a:rPr lang="en-US" smtClean="0"/>
-              <a:t>4/21/2012</a:t>
+              <a:t>4/22/2012</a:t>
             </a:fld>
             <a:endParaRPr lang="en-US"/>
           </a:p>
@@ -2283,7 +2375,7 @@
           <a:p>
             <a:fld id="{C77C966F-52A3-4FA9-9BCB-12A0FAAAB3FF}" type="datetimeFigureOut">
               <a:rPr lang="en-US" smtClean="0"/>
-              <a:t>4/21/2012</a:t>
+              <a:t>4/22/2012</a:t>
             </a:fld>
             <a:endParaRPr lang="en-US"/>
           </a:p>
@@ -2705,7 +2797,7 @@
           <a:p>
             <a:fld id="{C77C966F-52A3-4FA9-9BCB-12A0FAAAB3FF}" type="datetimeFigureOut">
               <a:rPr lang="en-US" smtClean="0"/>
-              <a:t>4/21/2012</a:t>
+              <a:t>4/22/2012</a:t>
             </a:fld>
             <a:endParaRPr lang="en-US"/>
           </a:p>
@@ -2823,7 +2915,7 @@
           <a:p>
             <a:fld id="{C77C966F-52A3-4FA9-9BCB-12A0FAAAB3FF}" type="datetimeFigureOut">
               <a:rPr lang="en-US" smtClean="0"/>
-              <a:t>4/21/2012</a:t>
+              <a:t>4/22/2012</a:t>
             </a:fld>
             <a:endParaRPr lang="en-US"/>
           </a:p>
@@ -2918,7 +3010,7 @@
           <a:p>
             <a:fld id="{C77C966F-52A3-4FA9-9BCB-12A0FAAAB3FF}" type="datetimeFigureOut">
               <a:rPr lang="en-US" smtClean="0"/>
-              <a:t>4/21/2012</a:t>
+              <a:t>4/22/2012</a:t>
             </a:fld>
             <a:endParaRPr lang="en-US"/>
           </a:p>
@@ -3195,7 +3287,7 @@
           <a:p>
             <a:fld id="{C77C966F-52A3-4FA9-9BCB-12A0FAAAB3FF}" type="datetimeFigureOut">
               <a:rPr lang="en-US" smtClean="0"/>
-              <a:t>4/21/2012</a:t>
+              <a:t>4/22/2012</a:t>
             </a:fld>
             <a:endParaRPr lang="en-US"/>
           </a:p>
@@ -3448,7 +3540,7 @@
           <a:p>
             <a:fld id="{C77C966F-52A3-4FA9-9BCB-12A0FAAAB3FF}" type="datetimeFigureOut">
               <a:rPr lang="en-US" smtClean="0"/>
-              <a:t>4/21/2012</a:t>
+              <a:t>4/22/2012</a:t>
             </a:fld>
             <a:endParaRPr lang="en-US"/>
           </a:p>
@@ -3670,7 +3762,7 @@
           <a:p>
             <a:fld id="{C77C966F-52A3-4FA9-9BCB-12A0FAAAB3FF}" type="datetimeFigureOut">
               <a:rPr lang="en-US" smtClean="0"/>
-              <a:t>4/21/2012</a:t>
+              <a:t>4/22/2012</a:t>
             </a:fld>
             <a:endParaRPr lang="en-US"/>
           </a:p>
@@ -4206,7 +4298,6 @@
               <a:rPr lang="en-US" dirty="0" smtClean="0"/>
               <a:t>Application Internals</a:t>
             </a:r>
-            <a:endParaRPr lang="en-US" dirty="0" smtClean="0"/>
           </a:p>
         </p:txBody>
       </p:sp>
@@ -4400,7 +4491,6 @@
               <a:rPr lang="en-US" dirty="0" smtClean="0"/>
               <a:t>Application Internals – Bar code reader</a:t>
             </a:r>
-            <a:endParaRPr lang="en-US" dirty="0" smtClean="0"/>
           </a:p>
         </p:txBody>
       </p:sp>
@@ -4608,7 +4698,6 @@
               <a:rPr lang="en-US" dirty="0" smtClean="0"/>
               <a:t>Difficulty with Android camera</a:t>
             </a:r>
-            <a:endParaRPr lang="en-US" dirty="0" smtClean="0"/>
           </a:p>
         </p:txBody>
       </p:sp>
@@ -4818,7 +4907,6 @@
               <a:rPr lang="en-US" dirty="0" smtClean="0"/>
               <a:t>Picture Quality</a:t>
             </a:r>
-            <a:endParaRPr lang="en-US" dirty="0" smtClean="0"/>
           </a:p>
         </p:txBody>
       </p:sp>
@@ -5051,7 +5139,6 @@
               <a:rPr lang="en-US" dirty="0" smtClean="0"/>
               <a:t>Lighting</a:t>
             </a:r>
-            <a:endParaRPr lang="en-US" dirty="0" smtClean="0"/>
           </a:p>
         </p:txBody>
       </p:sp>
@@ -5293,7 +5380,6 @@
               <a:rPr lang="en-US" dirty="0" smtClean="0"/>
               <a:t>Memory</a:t>
             </a:r>
-            <a:endParaRPr lang="en-US" dirty="0" smtClean="0"/>
           </a:p>
         </p:txBody>
       </p:sp>
@@ -5593,7 +5679,7 @@
         <p:spPr>
           <a:xfrm>
             <a:off x="482600" y="1600200"/>
-            <a:ext cx="8280400" cy="4267200"/>
+            <a:ext cx="8280400" cy="4572000"/>
           </a:xfrm>
           <a:gradFill flip="none" rotWithShape="1">
             <a:gsLst>
@@ -5616,13 +5702,34 @@
           <a:effectLst/>
         </p:spPr>
         <p:txBody>
-          <a:bodyPr/>
-          <a:lstStyle/>
-          <a:p>
-            <a:r>
-              <a:rPr lang="en-US" dirty="0" smtClean="0"/>
-              <a:t>Otsu’s Method</a:t>
-            </a:r>
+          <a:bodyPr>
+            <a:normAutofit fontScale="92500" lnSpcReduction="10000"/>
+          </a:bodyPr>
+          <a:lstStyle/>
+          <a:p>
+            <a:r>
+              <a:rPr lang="en-US" dirty="0" smtClean="0"/>
+              <a:t>Otsu’s </a:t>
+            </a:r>
+            <a:r>
+              <a:rPr lang="en-US" dirty="0" smtClean="0"/>
+              <a:t>Method</a:t>
+            </a:r>
+          </a:p>
+          <a:p>
+            <a:pPr lvl="1"/>
+            <a:r>
+              <a:rPr lang="en-US" dirty="0" smtClean="0"/>
+              <a:t>Worked well whole image</a:t>
+            </a:r>
+          </a:p>
+          <a:p>
+            <a:pPr lvl="1"/>
+            <a:r>
+              <a:rPr lang="en-US" dirty="0" smtClean="0"/>
+              <a:t>Not so well on a single line (expected)</a:t>
+            </a:r>
+            <a:endParaRPr lang="en-US" dirty="0" smtClean="0"/>
           </a:p>
           <a:p>
             <a:r>
@@ -5631,10 +5738,50 @@
             </a:r>
           </a:p>
           <a:p>
+            <a:pPr lvl="1"/>
+            <a:r>
+              <a:rPr lang="en-US" dirty="0" smtClean="0"/>
+              <a:t>Required an initial start threshold value</a:t>
+            </a:r>
+          </a:p>
+          <a:p>
+            <a:pPr lvl="1"/>
+            <a:r>
+              <a:rPr lang="en-US" dirty="0" smtClean="0"/>
+              <a:t>Always resulted in a local minimum</a:t>
+            </a:r>
+            <a:endParaRPr lang="en-US" dirty="0" smtClean="0"/>
+          </a:p>
+          <a:p>
             <a:r>
               <a:rPr lang="en-US" dirty="0" smtClean="0"/>
               <a:t>Modified</a:t>
             </a:r>
+          </a:p>
+          <a:p>
+            <a:pPr lvl="1"/>
+            <a:r>
+              <a:rPr lang="en-US" dirty="0" smtClean="0"/>
+              <a:t>Find the first largest peak</a:t>
+            </a:r>
+          </a:p>
+          <a:p>
+            <a:pPr lvl="1"/>
+            <a:r>
+              <a:rPr lang="en-US" dirty="0" smtClean="0"/>
+              <a:t>Find second largest furthest away from first</a:t>
+            </a:r>
+          </a:p>
+          <a:p>
+            <a:pPr lvl="1"/>
+            <a:r>
+              <a:rPr lang="en-US" dirty="0" smtClean="0"/>
+              <a:t>Find a low valley between the two</a:t>
+            </a:r>
+          </a:p>
+          <a:p>
+            <a:pPr lvl="1"/>
+            <a:endParaRPr lang="en-US" dirty="0" smtClean="0"/>
           </a:p>
           <a:p>
             <a:endParaRPr lang="en-US" dirty="0" smtClean="0"/>
@@ -5709,7 +5856,6 @@
               <a:rPr lang="en-US" dirty="0" smtClean="0"/>
               <a:t>Application Internals - UI</a:t>
             </a:r>
-            <a:endParaRPr lang="en-US" dirty="0" smtClean="0"/>
           </a:p>
         </p:txBody>
       </p:sp>
@@ -5891,7 +6037,6 @@
               <a:rPr lang="en-US" dirty="0" smtClean="0"/>
               <a:t>Demonstration of the Application</a:t>
             </a:r>
-            <a:endParaRPr lang="en-US" dirty="0" smtClean="0"/>
           </a:p>
         </p:txBody>
       </p:sp>
@@ -6021,7 +6166,6 @@
               <a:rPr lang="en-US" dirty="0" smtClean="0"/>
               <a:t>Questions?</a:t>
             </a:r>
-            <a:endParaRPr lang="en-US" dirty="0" smtClean="0"/>
           </a:p>
         </p:txBody>
       </p:sp>
@@ -6272,7 +6416,6 @@
               <a:rPr lang="en-US" dirty="0" smtClean="0"/>
               <a:t>Questions?</a:t>
             </a:r>
-            <a:endParaRPr lang="en-US" dirty="0" smtClean="0"/>
           </a:p>
           <a:p>
             <a:endParaRPr lang="en-US" dirty="0"/>
@@ -6826,7 +6969,6 @@
               <a:rPr lang="en-US" dirty="0" smtClean="0"/>
               <a:t>Ability to read all 1D product bar codes</a:t>
             </a:r>
-            <a:endParaRPr lang="en-US" dirty="0" smtClean="0"/>
           </a:p>
           <a:p>
             <a:r>
@@ -7136,7 +7278,6 @@
               <a:rPr lang="en-US" dirty="0" smtClean="0"/>
               <a:t>Time limitation</a:t>
             </a:r>
-            <a:endParaRPr lang="en-US" dirty="0" smtClean="0"/>
           </a:p>
           <a:p>
             <a:r>
@@ -7285,7 +7426,6 @@
               <a:rPr lang="en-US" dirty="0" smtClean="0"/>
               <a:t>Reading UPC Barcode</a:t>
             </a:r>
-            <a:endParaRPr lang="en-US" dirty="0" smtClean="0"/>
           </a:p>
         </p:txBody>
       </p:sp>
@@ -7376,7 +7516,6 @@
               <a:rPr lang="en-US" dirty="0" smtClean="0"/>
               <a:t>99,999 possible manufacturers</a:t>
             </a:r>
-            <a:endParaRPr lang="en-US" dirty="0" smtClean="0"/>
           </a:p>
           <a:p>
             <a:pPr lvl="1"/>
@@ -7574,7 +7713,6 @@
               <a:rPr lang="en-US" dirty="0" smtClean="0"/>
               <a:t>Reading UPC Barcode Guard Pattern</a:t>
             </a:r>
-            <a:endParaRPr lang="en-US" dirty="0" smtClean="0"/>
           </a:p>
         </p:txBody>
       </p:sp>
@@ -7954,7 +8092,6 @@
               <a:rPr lang="en-US" dirty="0" smtClean="0"/>
               <a:t>Reading UPC Barcode (Continued)</a:t>
             </a:r>
-            <a:endParaRPr lang="en-US" dirty="0" smtClean="0"/>
           </a:p>
         </p:txBody>
       </p:sp>
@@ -8212,7 +8349,6 @@
               <a:rPr lang="en-US" dirty="0" smtClean="0"/>
               <a:t>Also know as modules</a:t>
             </a:r>
-            <a:endParaRPr lang="en-US" dirty="0" smtClean="0"/>
           </a:p>
           <a:p>
             <a:r>
@@ -8868,7 +9004,6 @@
               <a:rPr lang="en-US" dirty="0" smtClean="0"/>
               <a:t>Reading UPC Barcode Check Digit</a:t>
             </a:r>
-            <a:endParaRPr lang="en-US" dirty="0" smtClean="0"/>
           </a:p>
         </p:txBody>
       </p:sp>

</xml_diff>

<commit_message>
Added a link to the code base.
</commit_message>
<xml_diff>
--- a/src/docs/Presentation/Got Movie Presentation.pptx
+++ b/src/docs/Presentation/Got Movie Presentation.pptx
@@ -5,29 +5,32 @@
     <p:sldMasterId id="2147483648" r:id="rId1"/>
   </p:sldMasterIdLst>
   <p:notesMasterIdLst>
-    <p:notesMasterId r:id="rId22"/>
+    <p:notesMasterId r:id="rId25"/>
   </p:notesMasterIdLst>
   <p:sldIdLst>
     <p:sldId id="256" r:id="rId2"/>
     <p:sldId id="257" r:id="rId3"/>
-    <p:sldId id="258" r:id="rId4"/>
-    <p:sldId id="259" r:id="rId5"/>
-    <p:sldId id="260" r:id="rId6"/>
-    <p:sldId id="261" r:id="rId7"/>
-    <p:sldId id="262" r:id="rId8"/>
-    <p:sldId id="264" r:id="rId9"/>
-    <p:sldId id="265" r:id="rId10"/>
-    <p:sldId id="266" r:id="rId11"/>
-    <p:sldId id="269" r:id="rId12"/>
-    <p:sldId id="270" r:id="rId13"/>
-    <p:sldId id="271" r:id="rId14"/>
-    <p:sldId id="272" r:id="rId15"/>
-    <p:sldId id="273" r:id="rId16"/>
-    <p:sldId id="274" r:id="rId17"/>
-    <p:sldId id="275" r:id="rId18"/>
-    <p:sldId id="268" r:id="rId19"/>
-    <p:sldId id="267" r:id="rId20"/>
-    <p:sldId id="263" r:id="rId21"/>
+    <p:sldId id="278" r:id="rId4"/>
+    <p:sldId id="258" r:id="rId5"/>
+    <p:sldId id="259" r:id="rId6"/>
+    <p:sldId id="260" r:id="rId7"/>
+    <p:sldId id="261" r:id="rId8"/>
+    <p:sldId id="262" r:id="rId9"/>
+    <p:sldId id="264" r:id="rId10"/>
+    <p:sldId id="265" r:id="rId11"/>
+    <p:sldId id="266" r:id="rId12"/>
+    <p:sldId id="269" r:id="rId13"/>
+    <p:sldId id="270" r:id="rId14"/>
+    <p:sldId id="271" r:id="rId15"/>
+    <p:sldId id="272" r:id="rId16"/>
+    <p:sldId id="273" r:id="rId17"/>
+    <p:sldId id="274" r:id="rId18"/>
+    <p:sldId id="275" r:id="rId19"/>
+    <p:sldId id="276" r:id="rId20"/>
+    <p:sldId id="277" r:id="rId21"/>
+    <p:sldId id="268" r:id="rId22"/>
+    <p:sldId id="267" r:id="rId23"/>
+    <p:sldId id="263" r:id="rId24"/>
   </p:sldIdLst>
   <p:sldSz cx="9144000" cy="6858000" type="screen4x3"/>
   <p:notesSz cx="6858000" cy="9144000"/>
@@ -211,7 +214,7 @@
           <a:p>
             <a:fld id="{2CE72240-98C4-4B34-89E0-94B328681D10}" type="datetimeFigureOut">
               <a:rPr lang="en-US" smtClean="0"/>
-              <a:t>4/22/2012</a:t>
+              <a:t>4/25/2012</a:t>
             </a:fld>
             <a:endParaRPr lang="en-US"/>
           </a:p>
@@ -552,7 +555,7 @@
           <a:p>
             <a:fld id="{E6D7A5A8-F93E-4C3E-AD80-07D1A2695B6B}" type="slidenum">
               <a:rPr lang="en-US" smtClean="0"/>
-              <a:t>4</a:t>
+              <a:t>5</a:t>
             </a:fld>
             <a:endParaRPr lang="en-US"/>
           </a:p>
@@ -771,7 +774,7 @@
           <a:p>
             <a:fld id="{E6D7A5A8-F93E-4C3E-AD80-07D1A2695B6B}" type="slidenum">
               <a:rPr lang="en-US" smtClean="0"/>
-              <a:t>6</a:t>
+              <a:t>7</a:t>
             </a:fld>
             <a:endParaRPr lang="en-US"/>
           </a:p>
@@ -855,7 +858,7 @@
           <a:p>
             <a:fld id="{E6D7A5A8-F93E-4C3E-AD80-07D1A2695B6B}" type="slidenum">
               <a:rPr lang="en-US" smtClean="0"/>
-              <a:t>8</a:t>
+              <a:t>9</a:t>
             </a:fld>
             <a:endParaRPr lang="en-US"/>
           </a:p>
@@ -939,7 +942,7 @@
           <a:p>
             <a:fld id="{E6D7A5A8-F93E-4C3E-AD80-07D1A2695B6B}" type="slidenum">
               <a:rPr lang="en-US" smtClean="0"/>
-              <a:t>9</a:t>
+              <a:t>10</a:t>
             </a:fld>
             <a:endParaRPr lang="en-US"/>
           </a:p>
@@ -1029,7 +1032,7 @@
           <a:p>
             <a:fld id="{E6D7A5A8-F93E-4C3E-AD80-07D1A2695B6B}" type="slidenum">
               <a:rPr lang="en-US" smtClean="0"/>
-              <a:t>15</a:t>
+              <a:t>16</a:t>
             </a:fld>
             <a:endParaRPr lang="en-US"/>
           </a:p>
@@ -1094,13 +1097,22 @@
           <a:p>
             <a:r>
               <a:rPr lang="en-US" dirty="0" smtClean="0"/>
-              <a:t>Modified uses distance to find the valley instead of foreground/background </a:t>
-            </a:r>
-            <a:r>
-              <a:rPr lang="en-US" smtClean="0"/>
-              <a:t>weight values.</a:t>
-            </a:r>
-            <a:endParaRPr lang="en-US"/>
+              <a:t>Modified uses distance to find the valley instead of foreground/background weight values.</a:t>
+            </a:r>
+          </a:p>
+          <a:p>
+            <a:endParaRPr lang="en-US" dirty="0" smtClean="0"/>
+          </a:p>
+          <a:p>
+            <a:r>
+              <a:rPr lang="en-US" dirty="0" smtClean="0"/>
+              <a:t>Also had</a:t>
+            </a:r>
+            <a:r>
+              <a:rPr lang="en-US" baseline="0" dirty="0" smtClean="0"/>
+              <a:t> to apply a -1 4 -1 sharpen kernel to the row.</a:t>
+            </a:r>
+            <a:endParaRPr lang="en-US" dirty="0"/>
           </a:p>
         </p:txBody>
       </p:sp>
@@ -1121,7 +1133,7 @@
           <a:p>
             <a:fld id="{E6D7A5A8-F93E-4C3E-AD80-07D1A2695B6B}" type="slidenum">
               <a:rPr lang="en-US" smtClean="0"/>
-              <a:t>16</a:t>
+              <a:t>17</a:t>
             </a:fld>
             <a:endParaRPr lang="en-US"/>
           </a:p>
@@ -1131,6 +1143,312 @@
     <p:extLst>
       <p:ext uri="{BB962C8B-B14F-4D97-AF65-F5344CB8AC3E}">
         <p14:creationId xmlns:p14="http://schemas.microsoft.com/office/powerpoint/2010/main" val="3104194775"/>
+      </p:ext>
+    </p:extLst>
+  </p:cSld>
+  <p:clrMapOvr>
+    <a:masterClrMapping/>
+  </p:clrMapOvr>
+</p:notes>
+</file>
+
+<file path=ppt/notesSlides/notesSlide7.xml><?xml version="1.0" encoding="utf-8"?>
+<p:notes xmlns:a="http://schemas.openxmlformats.org/drawingml/2006/main" xmlns:r="http://schemas.openxmlformats.org/officeDocument/2006/relationships" xmlns:p="http://schemas.openxmlformats.org/presentationml/2006/main">
+  <p:cSld>
+    <p:spTree>
+      <p:nvGrpSpPr>
+        <p:cNvPr id="1" name=""/>
+        <p:cNvGrpSpPr/>
+        <p:nvPr/>
+      </p:nvGrpSpPr>
+      <p:grpSpPr>
+        <a:xfrm>
+          <a:off x="0" y="0"/>
+          <a:ext cx="0" cy="0"/>
+          <a:chOff x="0" y="0"/>
+          <a:chExt cx="0" cy="0"/>
+        </a:xfrm>
+      </p:grpSpPr>
+      <p:sp>
+        <p:nvSpPr>
+          <p:cNvPr id="2" name="Slide Image Placeholder 1"/>
+          <p:cNvSpPr>
+            <a:spLocks noGrp="1" noRot="1" noChangeAspect="1"/>
+          </p:cNvSpPr>
+          <p:nvPr>
+            <p:ph type="sldImg"/>
+          </p:nvPr>
+        </p:nvSpPr>
+        <p:spPr/>
+      </p:sp>
+      <p:sp>
+        <p:nvSpPr>
+          <p:cNvPr id="3" name="Notes Placeholder 2"/>
+          <p:cNvSpPr>
+            <a:spLocks noGrp="1"/>
+          </p:cNvSpPr>
+          <p:nvPr>
+            <p:ph type="body" idx="1"/>
+          </p:nvPr>
+        </p:nvSpPr>
+        <p:spPr/>
+        <p:txBody>
+          <a:bodyPr/>
+          <a:lstStyle/>
+          <a:p>
+            <a:r>
+              <a:rPr lang="en-US" dirty="0" smtClean="0"/>
+              <a:t>Containers much like </a:t>
+            </a:r>
+            <a:r>
+              <a:rPr lang="en-US" dirty="0" err="1" smtClean="0"/>
+              <a:t>jpanel’s</a:t>
+            </a:r>
+            <a:r>
+              <a:rPr lang="en-US" baseline="0" dirty="0" smtClean="0"/>
+              <a:t>. Combine them to make all kinds </a:t>
+            </a:r>
+            <a:r>
+              <a:rPr lang="en-US" baseline="0" smtClean="0"/>
+              <a:t>of screens.</a:t>
+            </a:r>
+            <a:endParaRPr lang="en-US" smtClean="0"/>
+          </a:p>
+        </p:txBody>
+      </p:sp>
+      <p:sp>
+        <p:nvSpPr>
+          <p:cNvPr id="4" name="Slide Number Placeholder 3"/>
+          <p:cNvSpPr>
+            <a:spLocks noGrp="1"/>
+          </p:cNvSpPr>
+          <p:nvPr>
+            <p:ph type="sldNum" sz="quarter" idx="10"/>
+          </p:nvPr>
+        </p:nvSpPr>
+        <p:spPr/>
+        <p:txBody>
+          <a:bodyPr/>
+          <a:lstStyle/>
+          <a:p>
+            <a:fld id="{E6D7A5A8-F93E-4C3E-AD80-07D1A2695B6B}" type="slidenum">
+              <a:rPr lang="en-US" smtClean="0"/>
+              <a:t>18</a:t>
+            </a:fld>
+            <a:endParaRPr lang="en-US"/>
+          </a:p>
+        </p:txBody>
+      </p:sp>
+    </p:spTree>
+    <p:extLst>
+      <p:ext uri="{BB962C8B-B14F-4D97-AF65-F5344CB8AC3E}">
+        <p14:creationId xmlns:p14="http://schemas.microsoft.com/office/powerpoint/2010/main" val="3694499161"/>
+      </p:ext>
+    </p:extLst>
+  </p:cSld>
+  <p:clrMapOvr>
+    <a:masterClrMapping/>
+  </p:clrMapOvr>
+</p:notes>
+</file>
+
+<file path=ppt/notesSlides/notesSlide8.xml><?xml version="1.0" encoding="utf-8"?>
+<p:notes xmlns:a="http://schemas.openxmlformats.org/drawingml/2006/main" xmlns:r="http://schemas.openxmlformats.org/officeDocument/2006/relationships" xmlns:p="http://schemas.openxmlformats.org/presentationml/2006/main">
+  <p:cSld>
+    <p:spTree>
+      <p:nvGrpSpPr>
+        <p:cNvPr id="1" name=""/>
+        <p:cNvGrpSpPr/>
+        <p:nvPr/>
+      </p:nvGrpSpPr>
+      <p:grpSpPr>
+        <a:xfrm>
+          <a:off x="0" y="0"/>
+          <a:ext cx="0" cy="0"/>
+          <a:chOff x="0" y="0"/>
+          <a:chExt cx="0" cy="0"/>
+        </a:xfrm>
+      </p:grpSpPr>
+      <p:sp>
+        <p:nvSpPr>
+          <p:cNvPr id="2" name="Slide Image Placeholder 1"/>
+          <p:cNvSpPr>
+            <a:spLocks noGrp="1" noRot="1" noChangeAspect="1"/>
+          </p:cNvSpPr>
+          <p:nvPr>
+            <p:ph type="sldImg"/>
+          </p:nvPr>
+        </p:nvSpPr>
+        <p:spPr/>
+      </p:sp>
+      <p:sp>
+        <p:nvSpPr>
+          <p:cNvPr id="3" name="Notes Placeholder 2"/>
+          <p:cNvSpPr>
+            <a:spLocks noGrp="1"/>
+          </p:cNvSpPr>
+          <p:nvPr>
+            <p:ph type="body" idx="1"/>
+          </p:nvPr>
+        </p:nvSpPr>
+        <p:spPr/>
+        <p:txBody>
+          <a:bodyPr/>
+          <a:lstStyle/>
+          <a:p>
+            <a:r>
+              <a:rPr lang="en-US" dirty="0" smtClean="0"/>
+              <a:t>Usage cost money</a:t>
+            </a:r>
+            <a:r>
+              <a:rPr lang="en-US" baseline="0" dirty="0" smtClean="0"/>
+              <a:t> after an </a:t>
+            </a:r>
+            <a:r>
+              <a:rPr lang="en-US" baseline="0" smtClean="0"/>
+              <a:t>initial phase.</a:t>
+            </a:r>
+          </a:p>
+          <a:p>
+            <a:endParaRPr lang="en-US" smtClean="0"/>
+          </a:p>
+          <a:p>
+            <a:r>
+              <a:rPr lang="en-US" dirty="0" smtClean="0"/>
+              <a:t>TOS – Usage</a:t>
+            </a:r>
+            <a:r>
+              <a:rPr lang="en-US" baseline="0" dirty="0" smtClean="0"/>
+              <a:t> of WS should bring business to Amazon</a:t>
+            </a:r>
+            <a:endParaRPr lang="en-US" dirty="0"/>
+          </a:p>
+        </p:txBody>
+      </p:sp>
+      <p:sp>
+        <p:nvSpPr>
+          <p:cNvPr id="4" name="Slide Number Placeholder 3"/>
+          <p:cNvSpPr>
+            <a:spLocks noGrp="1"/>
+          </p:cNvSpPr>
+          <p:nvPr>
+            <p:ph type="sldNum" sz="quarter" idx="10"/>
+          </p:nvPr>
+        </p:nvSpPr>
+        <p:spPr/>
+        <p:txBody>
+          <a:bodyPr/>
+          <a:lstStyle/>
+          <a:p>
+            <a:fld id="{E6D7A5A8-F93E-4C3E-AD80-07D1A2695B6B}" type="slidenum">
+              <a:rPr lang="en-US" smtClean="0"/>
+              <a:t>19</a:t>
+            </a:fld>
+            <a:endParaRPr lang="en-US"/>
+          </a:p>
+        </p:txBody>
+      </p:sp>
+    </p:spTree>
+    <p:extLst>
+      <p:ext uri="{BB962C8B-B14F-4D97-AF65-F5344CB8AC3E}">
+        <p14:creationId xmlns:p14="http://schemas.microsoft.com/office/powerpoint/2010/main" val="4074927520"/>
+      </p:ext>
+    </p:extLst>
+  </p:cSld>
+  <p:clrMapOvr>
+    <a:masterClrMapping/>
+  </p:clrMapOvr>
+</p:notes>
+</file>
+
+<file path=ppt/notesSlides/notesSlide9.xml><?xml version="1.0" encoding="utf-8"?>
+<p:notes xmlns:a="http://schemas.openxmlformats.org/drawingml/2006/main" xmlns:r="http://schemas.openxmlformats.org/officeDocument/2006/relationships" xmlns:p="http://schemas.openxmlformats.org/presentationml/2006/main">
+  <p:cSld>
+    <p:spTree>
+      <p:nvGrpSpPr>
+        <p:cNvPr id="1" name=""/>
+        <p:cNvGrpSpPr/>
+        <p:nvPr/>
+      </p:nvGrpSpPr>
+      <p:grpSpPr>
+        <a:xfrm>
+          <a:off x="0" y="0"/>
+          <a:ext cx="0" cy="0"/>
+          <a:chOff x="0" y="0"/>
+          <a:chExt cx="0" cy="0"/>
+        </a:xfrm>
+      </p:grpSpPr>
+      <p:sp>
+        <p:nvSpPr>
+          <p:cNvPr id="2" name="Slide Image Placeholder 1"/>
+          <p:cNvSpPr>
+            <a:spLocks noGrp="1" noRot="1" noChangeAspect="1"/>
+          </p:cNvSpPr>
+          <p:nvPr>
+            <p:ph type="sldImg"/>
+          </p:nvPr>
+        </p:nvSpPr>
+        <p:spPr/>
+      </p:sp>
+      <p:sp>
+        <p:nvSpPr>
+          <p:cNvPr id="3" name="Notes Placeholder 2"/>
+          <p:cNvSpPr>
+            <a:spLocks noGrp="1"/>
+          </p:cNvSpPr>
+          <p:nvPr>
+            <p:ph type="body" idx="1"/>
+          </p:nvPr>
+        </p:nvSpPr>
+        <p:spPr/>
+        <p:txBody>
+          <a:bodyPr/>
+          <a:lstStyle/>
+          <a:p>
+            <a:r>
+              <a:rPr lang="en-US" dirty="0" smtClean="0"/>
+              <a:t>remote procedure call (RPC) protocol which uses XML to encode its calls and HTTP as a transport mechanism</a:t>
+            </a:r>
+          </a:p>
+          <a:p>
+            <a:endParaRPr lang="en-US" dirty="0" smtClean="0"/>
+          </a:p>
+          <a:p>
+            <a:r>
+              <a:rPr lang="en-US" dirty="0" smtClean="0"/>
+              <a:t>Series = TV shows, movie collections</a:t>
+            </a:r>
+            <a:endParaRPr lang="en-US" dirty="0"/>
+          </a:p>
+        </p:txBody>
+      </p:sp>
+      <p:sp>
+        <p:nvSpPr>
+          <p:cNvPr id="4" name="Slide Number Placeholder 3"/>
+          <p:cNvSpPr>
+            <a:spLocks noGrp="1"/>
+          </p:cNvSpPr>
+          <p:nvPr>
+            <p:ph type="sldNum" sz="quarter" idx="10"/>
+          </p:nvPr>
+        </p:nvSpPr>
+        <p:spPr/>
+        <p:txBody>
+          <a:bodyPr/>
+          <a:lstStyle/>
+          <a:p>
+            <a:fld id="{E6D7A5A8-F93E-4C3E-AD80-07D1A2695B6B}" type="slidenum">
+              <a:rPr lang="en-US" smtClean="0"/>
+              <a:t>20</a:t>
+            </a:fld>
+            <a:endParaRPr lang="en-US"/>
+          </a:p>
+        </p:txBody>
+      </p:sp>
+    </p:spTree>
+    <p:extLst>
+      <p:ext uri="{BB962C8B-B14F-4D97-AF65-F5344CB8AC3E}">
+        <p14:creationId xmlns:p14="http://schemas.microsoft.com/office/powerpoint/2010/main" val="4074927520"/>
       </p:ext>
     </p:extLst>
   </p:cSld>
@@ -1321,7 +1639,7 @@
           <a:p>
             <a:fld id="{C77C966F-52A3-4FA9-9BCB-12A0FAAAB3FF}" type="datetimeFigureOut">
               <a:rPr lang="en-US" smtClean="0"/>
-              <a:t>4/22/2012</a:t>
+              <a:t>4/25/2012</a:t>
             </a:fld>
             <a:endParaRPr lang="en-US"/>
           </a:p>
@@ -1491,7 +1809,7 @@
           <a:p>
             <a:fld id="{C77C966F-52A3-4FA9-9BCB-12A0FAAAB3FF}" type="datetimeFigureOut">
               <a:rPr lang="en-US" smtClean="0"/>
-              <a:t>4/22/2012</a:t>
+              <a:t>4/25/2012</a:t>
             </a:fld>
             <a:endParaRPr lang="en-US"/>
           </a:p>
@@ -1671,7 +1989,7 @@
           <a:p>
             <a:fld id="{C77C966F-52A3-4FA9-9BCB-12A0FAAAB3FF}" type="datetimeFigureOut">
               <a:rPr lang="en-US" smtClean="0"/>
-              <a:t>4/22/2012</a:t>
+              <a:t>4/25/2012</a:t>
             </a:fld>
             <a:endParaRPr lang="en-US"/>
           </a:p>
@@ -1841,7 +2159,7 @@
           <a:p>
             <a:fld id="{C77C966F-52A3-4FA9-9BCB-12A0FAAAB3FF}" type="datetimeFigureOut">
               <a:rPr lang="en-US" smtClean="0"/>
-              <a:t>4/22/2012</a:t>
+              <a:t>4/25/2012</a:t>
             </a:fld>
             <a:endParaRPr lang="en-US"/>
           </a:p>
@@ -2087,7 +2405,7 @@
           <a:p>
             <a:fld id="{C77C966F-52A3-4FA9-9BCB-12A0FAAAB3FF}" type="datetimeFigureOut">
               <a:rPr lang="en-US" smtClean="0"/>
-              <a:t>4/22/2012</a:t>
+              <a:t>4/25/2012</a:t>
             </a:fld>
             <a:endParaRPr lang="en-US"/>
           </a:p>
@@ -2375,7 +2693,7 @@
           <a:p>
             <a:fld id="{C77C966F-52A3-4FA9-9BCB-12A0FAAAB3FF}" type="datetimeFigureOut">
               <a:rPr lang="en-US" smtClean="0"/>
-              <a:t>4/22/2012</a:t>
+              <a:t>4/25/2012</a:t>
             </a:fld>
             <a:endParaRPr lang="en-US"/>
           </a:p>
@@ -2797,7 +3115,7 @@
           <a:p>
             <a:fld id="{C77C966F-52A3-4FA9-9BCB-12A0FAAAB3FF}" type="datetimeFigureOut">
               <a:rPr lang="en-US" smtClean="0"/>
-              <a:t>4/22/2012</a:t>
+              <a:t>4/25/2012</a:t>
             </a:fld>
             <a:endParaRPr lang="en-US"/>
           </a:p>
@@ -2915,7 +3233,7 @@
           <a:p>
             <a:fld id="{C77C966F-52A3-4FA9-9BCB-12A0FAAAB3FF}" type="datetimeFigureOut">
               <a:rPr lang="en-US" smtClean="0"/>
-              <a:t>4/22/2012</a:t>
+              <a:t>4/25/2012</a:t>
             </a:fld>
             <a:endParaRPr lang="en-US"/>
           </a:p>
@@ -3010,7 +3328,7 @@
           <a:p>
             <a:fld id="{C77C966F-52A3-4FA9-9BCB-12A0FAAAB3FF}" type="datetimeFigureOut">
               <a:rPr lang="en-US" smtClean="0"/>
-              <a:t>4/22/2012</a:t>
+              <a:t>4/25/2012</a:t>
             </a:fld>
             <a:endParaRPr lang="en-US"/>
           </a:p>
@@ -3287,7 +3605,7 @@
           <a:p>
             <a:fld id="{C77C966F-52A3-4FA9-9BCB-12A0FAAAB3FF}" type="datetimeFigureOut">
               <a:rPr lang="en-US" smtClean="0"/>
-              <a:t>4/22/2012</a:t>
+              <a:t>4/25/2012</a:t>
             </a:fld>
             <a:endParaRPr lang="en-US"/>
           </a:p>
@@ -3540,7 +3858,7 @@
           <a:p>
             <a:fld id="{C77C966F-52A3-4FA9-9BCB-12A0FAAAB3FF}" type="datetimeFigureOut">
               <a:rPr lang="en-US" smtClean="0"/>
-              <a:t>4/22/2012</a:t>
+              <a:t>4/25/2012</a:t>
             </a:fld>
             <a:endParaRPr lang="en-US"/>
           </a:p>
@@ -3762,7 +4080,7 @@
           <a:p>
             <a:fld id="{C77C966F-52A3-4FA9-9BCB-12A0FAAAB3FF}" type="datetimeFigureOut">
               <a:rPr lang="en-US" smtClean="0"/>
-              <a:t>4/22/2012</a:t>
+              <a:t>4/25/2012</a:t>
             </a:fld>
             <a:endParaRPr lang="en-US"/>
           </a:p>
@@ -4296,72 +4614,8 @@
             <a:pPr algn="l"/>
             <a:r>
               <a:rPr lang="en-US" dirty="0" smtClean="0"/>
-              <a:t>Application Internals</a:t>
-            </a:r>
-          </a:p>
-        </p:txBody>
-      </p:sp>
-      <p:sp>
-        <p:nvSpPr>
-          <p:cNvPr id="1150" name="Content Placeholder 1149"/>
-          <p:cNvSpPr>
-            <a:spLocks noGrp="1"/>
-          </p:cNvSpPr>
-          <p:nvPr>
-            <p:ph idx="1"/>
-          </p:nvPr>
-        </p:nvSpPr>
-        <p:spPr>
-          <a:xfrm>
-            <a:off x="457200" y="1600201"/>
-            <a:ext cx="7848600" cy="4038599"/>
-          </a:xfrm>
-          <a:gradFill flip="none" rotWithShape="1">
-            <a:gsLst>
-              <a:gs pos="66000">
-                <a:schemeClr val="bg1">
-                  <a:lumMod val="65000"/>
-                  <a:alpha val="0"/>
-                </a:schemeClr>
-              </a:gs>
-              <a:gs pos="100000">
-                <a:schemeClr val="bg1">
-                  <a:lumMod val="85000"/>
-                  <a:alpha val="86000"/>
-                </a:schemeClr>
-              </a:gs>
-            </a:gsLst>
-            <a:lin ang="5400000" scaled="1"/>
-            <a:tileRect/>
-          </a:gradFill>
-          <a:effectLst/>
-        </p:spPr>
-        <p:txBody>
-          <a:bodyPr/>
-          <a:lstStyle/>
-          <a:p>
-            <a:r>
-              <a:rPr lang="en-US" dirty="0" smtClean="0"/>
-              <a:t>Application is written in Java</a:t>
-            </a:r>
-          </a:p>
-          <a:p>
-            <a:r>
-              <a:rPr lang="en-US" dirty="0" smtClean="0"/>
-              <a:t>XML RPC Client is the only Third party library</a:t>
-            </a:r>
-          </a:p>
-          <a:p>
-            <a:r>
-              <a:rPr lang="en-US" dirty="0" smtClean="0"/>
-              <a:t>Basic user interface</a:t>
-            </a:r>
-          </a:p>
-          <a:p>
-            <a:endParaRPr lang="en-US" dirty="0" smtClean="0"/>
-          </a:p>
-          <a:p>
-            <a:endParaRPr lang="en-US" dirty="0"/>
+              <a:t>Reading UPC Barcode Check Digit</a:t>
+            </a:r>
           </a:p>
         </p:txBody>
       </p:sp>
@@ -4422,14 +4676,355 @@
           <a:lstStyle/>
           <a:p>
             <a:pPr algn="ctr"/>
-            <a:endParaRPr lang="en-US"/>
+            <a:endParaRPr lang="en-US">
+              <a:solidFill>
+                <a:prstClr val="white"/>
+              </a:solidFill>
+            </a:endParaRPr>
+          </a:p>
+        </p:txBody>
+      </p:sp>
+      <p:sp>
+        <p:nvSpPr>
+          <p:cNvPr id="7" name="Content Placeholder 1149"/>
+          <p:cNvSpPr txBox="1">
+            <a:spLocks/>
+          </p:cNvSpPr>
+          <p:nvPr/>
+        </p:nvSpPr>
+        <p:spPr>
+          <a:xfrm>
+            <a:off x="482600" y="1676400"/>
+            <a:ext cx="5613400" cy="4419600"/>
+          </a:xfrm>
+          <a:prstGeom prst="rect">
+            <a:avLst/>
+          </a:prstGeom>
+          <a:gradFill flip="none" rotWithShape="1">
+            <a:gsLst>
+              <a:gs pos="66000">
+                <a:schemeClr val="bg1">
+                  <a:lumMod val="65000"/>
+                  <a:alpha val="0"/>
+                </a:schemeClr>
+              </a:gs>
+              <a:gs pos="100000">
+                <a:schemeClr val="bg1">
+                  <a:lumMod val="85000"/>
+                  <a:alpha val="86000"/>
+                </a:schemeClr>
+              </a:gs>
+            </a:gsLst>
+            <a:lin ang="5400000" scaled="1"/>
+            <a:tileRect/>
+          </a:gradFill>
+          <a:effectLst/>
+        </p:spPr>
+        <p:txBody>
+          <a:bodyPr vert="horz" lIns="91440" tIns="45720" rIns="91440" bIns="45720" rtlCol="0">
+            <a:normAutofit fontScale="92500"/>
+          </a:bodyPr>
+          <a:lstStyle>
+            <a:lvl1pPr marL="342900" indent="-342900" algn="l" defTabSz="914400" rtl="0" eaLnBrk="1" latinLnBrk="0" hangingPunct="1">
+              <a:spcBef>
+                <a:spcPct val="20000"/>
+              </a:spcBef>
+              <a:buFont typeface="Arial" pitchFamily="34" charset="0"/>
+              <a:buChar char="•"/>
+              <a:defRPr sz="3200" kern="1200">
+                <a:solidFill>
+                  <a:schemeClr val="tx1"/>
+                </a:solidFill>
+                <a:latin typeface="+mn-lt"/>
+                <a:ea typeface="+mn-ea"/>
+                <a:cs typeface="+mn-cs"/>
+              </a:defRPr>
+            </a:lvl1pPr>
+            <a:lvl2pPr marL="742950" indent="-285750" algn="l" defTabSz="914400" rtl="0" eaLnBrk="1" latinLnBrk="0" hangingPunct="1">
+              <a:spcBef>
+                <a:spcPct val="20000"/>
+              </a:spcBef>
+              <a:buFont typeface="Arial" pitchFamily="34" charset="0"/>
+              <a:buChar char="–"/>
+              <a:defRPr sz="2800" kern="1200">
+                <a:solidFill>
+                  <a:schemeClr val="tx1"/>
+                </a:solidFill>
+                <a:latin typeface="+mn-lt"/>
+                <a:ea typeface="+mn-ea"/>
+                <a:cs typeface="+mn-cs"/>
+              </a:defRPr>
+            </a:lvl2pPr>
+            <a:lvl3pPr marL="1143000" indent="-228600" algn="l" defTabSz="914400" rtl="0" eaLnBrk="1" latinLnBrk="0" hangingPunct="1">
+              <a:spcBef>
+                <a:spcPct val="20000"/>
+              </a:spcBef>
+              <a:buFont typeface="Arial" pitchFamily="34" charset="0"/>
+              <a:buChar char="•"/>
+              <a:defRPr sz="2400" kern="1200">
+                <a:solidFill>
+                  <a:schemeClr val="tx1"/>
+                </a:solidFill>
+                <a:latin typeface="+mn-lt"/>
+                <a:ea typeface="+mn-ea"/>
+                <a:cs typeface="+mn-cs"/>
+              </a:defRPr>
+            </a:lvl3pPr>
+            <a:lvl4pPr marL="1600200" indent="-228600" algn="l" defTabSz="914400" rtl="0" eaLnBrk="1" latinLnBrk="0" hangingPunct="1">
+              <a:spcBef>
+                <a:spcPct val="20000"/>
+              </a:spcBef>
+              <a:buFont typeface="Arial" pitchFamily="34" charset="0"/>
+              <a:buChar char="–"/>
+              <a:defRPr sz="2000" kern="1200">
+                <a:solidFill>
+                  <a:schemeClr val="tx1"/>
+                </a:solidFill>
+                <a:latin typeface="+mn-lt"/>
+                <a:ea typeface="+mn-ea"/>
+                <a:cs typeface="+mn-cs"/>
+              </a:defRPr>
+            </a:lvl4pPr>
+            <a:lvl5pPr marL="2057400" indent="-228600" algn="l" defTabSz="914400" rtl="0" eaLnBrk="1" latinLnBrk="0" hangingPunct="1">
+              <a:spcBef>
+                <a:spcPct val="20000"/>
+              </a:spcBef>
+              <a:buFont typeface="Arial" pitchFamily="34" charset="0"/>
+              <a:buChar char="»"/>
+              <a:defRPr sz="2000" kern="1200">
+                <a:solidFill>
+                  <a:schemeClr val="tx1"/>
+                </a:solidFill>
+                <a:latin typeface="+mn-lt"/>
+                <a:ea typeface="+mn-ea"/>
+                <a:cs typeface="+mn-cs"/>
+              </a:defRPr>
+            </a:lvl5pPr>
+            <a:lvl6pPr marL="2514600" indent="-228600" algn="l" defTabSz="914400" rtl="0" eaLnBrk="1" latinLnBrk="0" hangingPunct="1">
+              <a:spcBef>
+                <a:spcPct val="20000"/>
+              </a:spcBef>
+              <a:buFont typeface="Arial" pitchFamily="34" charset="0"/>
+              <a:buChar char="•"/>
+              <a:defRPr sz="2000" kern="1200">
+                <a:solidFill>
+                  <a:schemeClr val="tx1"/>
+                </a:solidFill>
+                <a:latin typeface="+mn-lt"/>
+                <a:ea typeface="+mn-ea"/>
+                <a:cs typeface="+mn-cs"/>
+              </a:defRPr>
+            </a:lvl6pPr>
+            <a:lvl7pPr marL="2971800" indent="-228600" algn="l" defTabSz="914400" rtl="0" eaLnBrk="1" latinLnBrk="0" hangingPunct="1">
+              <a:spcBef>
+                <a:spcPct val="20000"/>
+              </a:spcBef>
+              <a:buFont typeface="Arial" pitchFamily="34" charset="0"/>
+              <a:buChar char="•"/>
+              <a:defRPr sz="2000" kern="1200">
+                <a:solidFill>
+                  <a:schemeClr val="tx1"/>
+                </a:solidFill>
+                <a:latin typeface="+mn-lt"/>
+                <a:ea typeface="+mn-ea"/>
+                <a:cs typeface="+mn-cs"/>
+              </a:defRPr>
+            </a:lvl7pPr>
+            <a:lvl8pPr marL="3429000" indent="-228600" algn="l" defTabSz="914400" rtl="0" eaLnBrk="1" latinLnBrk="0" hangingPunct="1">
+              <a:spcBef>
+                <a:spcPct val="20000"/>
+              </a:spcBef>
+              <a:buFont typeface="Arial" pitchFamily="34" charset="0"/>
+              <a:buChar char="•"/>
+              <a:defRPr sz="2000" kern="1200">
+                <a:solidFill>
+                  <a:schemeClr val="tx1"/>
+                </a:solidFill>
+                <a:latin typeface="+mn-lt"/>
+                <a:ea typeface="+mn-ea"/>
+                <a:cs typeface="+mn-cs"/>
+              </a:defRPr>
+            </a:lvl8pPr>
+            <a:lvl9pPr marL="3886200" indent="-228600" algn="l" defTabSz="914400" rtl="0" eaLnBrk="1" latinLnBrk="0" hangingPunct="1">
+              <a:spcBef>
+                <a:spcPct val="20000"/>
+              </a:spcBef>
+              <a:buFont typeface="Arial" pitchFamily="34" charset="0"/>
+              <a:buChar char="•"/>
+              <a:defRPr sz="2000" kern="1200">
+                <a:solidFill>
+                  <a:schemeClr val="tx1"/>
+                </a:solidFill>
+                <a:latin typeface="+mn-lt"/>
+                <a:ea typeface="+mn-ea"/>
+                <a:cs typeface="+mn-cs"/>
+              </a:defRPr>
+            </a:lvl9pPr>
+          </a:lstStyle>
+          <a:p>
+            <a:r>
+              <a:rPr lang="en-US" dirty="0" smtClean="0"/>
+              <a:t>Last Digit of a UPC</a:t>
+            </a:r>
+          </a:p>
+          <a:p>
+            <a:r>
+              <a:rPr lang="en-US" dirty="0" smtClean="0"/>
+              <a:t>Calculated from other digits by</a:t>
+            </a:r>
+            <a:endParaRPr lang="en-US" dirty="0"/>
+          </a:p>
+          <a:p>
+            <a:pPr lvl="1"/>
+            <a:r>
+              <a:rPr lang="en-US" dirty="0" smtClean="0"/>
+              <a:t>Adding odd digits, multiply by 3</a:t>
+            </a:r>
+          </a:p>
+          <a:p>
+            <a:pPr lvl="1"/>
+            <a:r>
+              <a:rPr lang="en-US" dirty="0" smtClean="0"/>
+              <a:t>Add even digits (excluding check digit)</a:t>
+            </a:r>
+          </a:p>
+          <a:p>
+            <a:pPr lvl="1"/>
+            <a:r>
+              <a:rPr lang="en-US" dirty="0" smtClean="0"/>
+              <a:t>Add the sums</a:t>
+            </a:r>
+          </a:p>
+          <a:p>
+            <a:pPr lvl="1"/>
+            <a:r>
+              <a:rPr lang="en-US" dirty="0" smtClean="0"/>
+              <a:t>Perform a modulo 10</a:t>
+            </a:r>
+          </a:p>
+          <a:p>
+            <a:pPr lvl="2"/>
+            <a:r>
+              <a:rPr lang="en-US" dirty="0" smtClean="0"/>
+              <a:t>If result is 0 check digit is 0</a:t>
+            </a:r>
+          </a:p>
+          <a:p>
+            <a:pPr lvl="2"/>
+            <a:r>
+              <a:rPr lang="en-US" dirty="0" smtClean="0"/>
+              <a:t>Else check digit should be 10 - result</a:t>
+            </a:r>
+          </a:p>
+        </p:txBody>
+      </p:sp>
+      <p:pic>
+        <p:nvPicPr>
+          <p:cNvPr id="3" name="Picture 2"/>
+          <p:cNvPicPr>
+            <a:picLocks noChangeAspect="1"/>
+          </p:cNvPicPr>
+          <p:nvPr/>
+        </p:nvPicPr>
+        <p:blipFill>
+          <a:blip r:embed="rId3">
+            <a:extLst>
+              <a:ext uri="{28A0092B-C50C-407E-A947-70E740481C1C}">
+                <a14:useLocalDpi xmlns:a14="http://schemas.microsoft.com/office/drawing/2010/main" val="0"/>
+              </a:ext>
+            </a:extLst>
+          </a:blip>
+          <a:stretch>
+            <a:fillRect/>
+          </a:stretch>
+        </p:blipFill>
+        <p:spPr>
+          <a:xfrm>
+            <a:off x="6464300" y="1676400"/>
+            <a:ext cx="2171700" cy="1819275"/>
+          </a:xfrm>
+          <a:prstGeom prst="rect">
+            <a:avLst/>
+          </a:prstGeom>
+        </p:spPr>
+      </p:pic>
+      <p:sp>
+        <p:nvSpPr>
+          <p:cNvPr id="4" name="TextBox 3"/>
+          <p:cNvSpPr txBox="1"/>
+          <p:nvPr/>
+        </p:nvSpPr>
+        <p:spPr>
+          <a:xfrm>
+            <a:off x="5257800" y="3886200"/>
+            <a:ext cx="3886200" cy="1200329"/>
+          </a:xfrm>
+          <a:prstGeom prst="rect">
+            <a:avLst/>
+          </a:prstGeom>
+          <a:noFill/>
+        </p:spPr>
+        <p:txBody>
+          <a:bodyPr wrap="square" rtlCol="0">
+            <a:spAutoFit/>
+          </a:bodyPr>
+          <a:lstStyle/>
+          <a:p>
+            <a:r>
+              <a:rPr lang="en-US" dirty="0" smtClean="0"/>
+              <a:t>Odd Sum: 5+3+0+1+6+0 </a:t>
+            </a:r>
+            <a:r>
+              <a:rPr lang="en-US" dirty="0"/>
+              <a:t>= </a:t>
+            </a:r>
+            <a:r>
+              <a:rPr lang="en-US" dirty="0" smtClean="0"/>
+              <a:t>15 * 3 </a:t>
+            </a:r>
+            <a:r>
+              <a:rPr lang="en-US" dirty="0"/>
+              <a:t>= 45</a:t>
+            </a:r>
+          </a:p>
+          <a:p>
+            <a:r>
+              <a:rPr lang="en-US" dirty="0" smtClean="0"/>
+              <a:t>Even Sum: 4+0+0+8+7 </a:t>
+            </a:r>
+            <a:r>
+              <a:rPr lang="en-US" dirty="0"/>
+              <a:t>= 19</a:t>
+            </a:r>
+          </a:p>
+          <a:p>
+            <a:r>
+              <a:rPr lang="en-US" dirty="0" smtClean="0"/>
+              <a:t>Sum Mod 10: 45+19 </a:t>
+            </a:r>
+            <a:r>
+              <a:rPr lang="en-US" dirty="0"/>
+              <a:t>= </a:t>
+            </a:r>
+            <a:r>
+              <a:rPr lang="en-US" dirty="0" smtClean="0"/>
+              <a:t>64 % 10 = 4</a:t>
+            </a:r>
+            <a:endParaRPr lang="en-US" dirty="0"/>
+          </a:p>
+          <a:p>
+            <a:r>
+              <a:rPr lang="en-US" dirty="0" smtClean="0"/>
+              <a:t>Check Digit: 10 – 4 = 6</a:t>
+            </a:r>
+            <a:endParaRPr lang="en-US" dirty="0"/>
           </a:p>
         </p:txBody>
       </p:sp>
     </p:spTree>
     <p:extLst>
       <p:ext uri="{BB962C8B-B14F-4D97-AF65-F5344CB8AC3E}">
-        <p14:creationId xmlns:p14="http://schemas.microsoft.com/office/powerpoint/2010/main" val="1652368456"/>
+        <p14:creationId xmlns:p14="http://schemas.microsoft.com/office/powerpoint/2010/main" val="2096951698"/>
       </p:ext>
     </p:extLst>
   </p:cSld>
@@ -4439,9 +5034,88 @@
   <p:timing>
     <p:tnLst>
       <p:par>
-        <p:cTn id="1" dur="indefinite" restart="never" nodeType="tmRoot"/>
+        <p:cTn id="1" dur="indefinite" restart="never" nodeType="tmRoot">
+          <p:childTnLst>
+            <p:seq concurrent="1" nextAc="seek">
+              <p:cTn id="2" dur="indefinite" nodeType="mainSeq">
+                <p:childTnLst>
+                  <p:par>
+                    <p:cTn id="3" fill="hold">
+                      <p:stCondLst>
+                        <p:cond delay="indefinite"/>
+                      </p:stCondLst>
+                      <p:childTnLst>
+                        <p:par>
+                          <p:cTn id="4" fill="hold">
+                            <p:stCondLst>
+                              <p:cond delay="0"/>
+                            </p:stCondLst>
+                            <p:childTnLst>
+                              <p:par>
+                                <p:cTn id="5" presetID="10" presetClass="entr" presetSubtype="0" fill="hold" grpId="0" nodeType="clickEffect">
+                                  <p:stCondLst>
+                                    <p:cond delay="0"/>
+                                  </p:stCondLst>
+                                  <p:childTnLst>
+                                    <p:set>
+                                      <p:cBhvr>
+                                        <p:cTn id="6" dur="1" fill="hold">
+                                          <p:stCondLst>
+                                            <p:cond delay="0"/>
+                                          </p:stCondLst>
+                                        </p:cTn>
+                                        <p:tgtEl>
+                                          <p:spTgt spid="4"/>
+                                        </p:tgtEl>
+                                        <p:attrNameLst>
+                                          <p:attrName>style.visibility</p:attrName>
+                                        </p:attrNameLst>
+                                      </p:cBhvr>
+                                      <p:to>
+                                        <p:strVal val="visible"/>
+                                      </p:to>
+                                    </p:set>
+                                    <p:animEffect transition="in" filter="fade">
+                                      <p:cBhvr>
+                                        <p:cTn id="7" dur="500"/>
+                                        <p:tgtEl>
+                                          <p:spTgt spid="4"/>
+                                        </p:tgtEl>
+                                      </p:cBhvr>
+                                    </p:animEffect>
+                                  </p:childTnLst>
+                                </p:cTn>
+                              </p:par>
+                            </p:childTnLst>
+                          </p:cTn>
+                        </p:par>
+                      </p:childTnLst>
+                    </p:cTn>
+                  </p:par>
+                </p:childTnLst>
+              </p:cTn>
+              <p:prevCondLst>
+                <p:cond evt="onPrev" delay="0">
+                  <p:tgtEl>
+                    <p:sldTgt/>
+                  </p:tgtEl>
+                </p:cond>
+              </p:prevCondLst>
+              <p:nextCondLst>
+                <p:cond evt="onNext" delay="0">
+                  <p:tgtEl>
+                    <p:sldTgt/>
+                  </p:tgtEl>
+                </p:cond>
+              </p:nextCondLst>
+            </p:seq>
+          </p:childTnLst>
+        </p:cTn>
       </p:par>
     </p:tnLst>
+    <p:bldLst>
+      <p:bldP spid="4" grpId="0"/>
+    </p:bldLst>
   </p:timing>
 </p:sld>
 </file>
@@ -4489,8 +5163,72 @@
             <a:pPr algn="l"/>
             <a:r>
               <a:rPr lang="en-US" dirty="0" smtClean="0"/>
-              <a:t>Application Internals – Bar code reader</a:t>
-            </a:r>
+              <a:t>Application Internals</a:t>
+            </a:r>
+          </a:p>
+        </p:txBody>
+      </p:sp>
+      <p:sp>
+        <p:nvSpPr>
+          <p:cNvPr id="1150" name="Content Placeholder 1149"/>
+          <p:cNvSpPr>
+            <a:spLocks noGrp="1"/>
+          </p:cNvSpPr>
+          <p:nvPr>
+            <p:ph idx="1"/>
+          </p:nvPr>
+        </p:nvSpPr>
+        <p:spPr>
+          <a:xfrm>
+            <a:off x="457200" y="1600201"/>
+            <a:ext cx="7848600" cy="4038599"/>
+          </a:xfrm>
+          <a:gradFill flip="none" rotWithShape="1">
+            <a:gsLst>
+              <a:gs pos="66000">
+                <a:schemeClr val="bg1">
+                  <a:lumMod val="65000"/>
+                  <a:alpha val="0"/>
+                </a:schemeClr>
+              </a:gs>
+              <a:gs pos="100000">
+                <a:schemeClr val="bg1">
+                  <a:lumMod val="85000"/>
+                  <a:alpha val="86000"/>
+                </a:schemeClr>
+              </a:gs>
+            </a:gsLst>
+            <a:lin ang="5400000" scaled="1"/>
+            <a:tileRect/>
+          </a:gradFill>
+          <a:effectLst/>
+        </p:spPr>
+        <p:txBody>
+          <a:bodyPr/>
+          <a:lstStyle/>
+          <a:p>
+            <a:r>
+              <a:rPr lang="en-US" dirty="0" smtClean="0"/>
+              <a:t>Application is written in Java</a:t>
+            </a:r>
+          </a:p>
+          <a:p>
+            <a:r>
+              <a:rPr lang="en-US" dirty="0" smtClean="0"/>
+              <a:t>XML RPC Client is the only Third party library</a:t>
+            </a:r>
+          </a:p>
+          <a:p>
+            <a:r>
+              <a:rPr lang="en-US" dirty="0" smtClean="0"/>
+              <a:t>Basic user interface</a:t>
+            </a:r>
+          </a:p>
+          <a:p>
+            <a:endParaRPr lang="en-US" dirty="0" smtClean="0"/>
+          </a:p>
+          <a:p>
+            <a:endParaRPr lang="en-US" dirty="0"/>
           </a:p>
         </p:txBody>
       </p:sp>
@@ -4555,88 +5293,10 @@
           </a:p>
         </p:txBody>
       </p:sp>
-      <p:sp>
-        <p:nvSpPr>
-          <p:cNvPr id="12" name="Content Placeholder 1149"/>
-          <p:cNvSpPr>
-            <a:spLocks noGrp="1"/>
-          </p:cNvSpPr>
-          <p:nvPr>
-            <p:ph idx="1"/>
-          </p:nvPr>
-        </p:nvSpPr>
-        <p:spPr>
-          <a:xfrm>
-            <a:off x="482600" y="1600200"/>
-            <a:ext cx="8280400" cy="4267200"/>
-          </a:xfrm>
-          <a:gradFill flip="none" rotWithShape="1">
-            <a:gsLst>
-              <a:gs pos="66000">
-                <a:schemeClr val="bg1">
-                  <a:lumMod val="65000"/>
-                  <a:alpha val="0"/>
-                </a:schemeClr>
-              </a:gs>
-              <a:gs pos="100000">
-                <a:schemeClr val="bg1">
-                  <a:lumMod val="85000"/>
-                  <a:alpha val="86000"/>
-                </a:schemeClr>
-              </a:gs>
-            </a:gsLst>
-            <a:lin ang="5400000" scaled="1"/>
-            <a:tileRect/>
-          </a:gradFill>
-          <a:effectLst/>
-        </p:spPr>
-        <p:txBody>
-          <a:bodyPr/>
-          <a:lstStyle/>
-          <a:p>
-            <a:r>
-              <a:rPr lang="en-US" dirty="0" smtClean="0"/>
-              <a:t>Difficulty with Android camera</a:t>
-            </a:r>
-          </a:p>
-          <a:p>
-            <a:r>
-              <a:rPr lang="en-US" dirty="0" smtClean="0"/>
-              <a:t>Picture Quality</a:t>
-            </a:r>
-          </a:p>
-          <a:p>
-            <a:r>
-              <a:rPr lang="en-US" dirty="0" smtClean="0"/>
-              <a:t>Lighting</a:t>
-            </a:r>
-          </a:p>
-          <a:p>
-            <a:r>
-              <a:rPr lang="en-US" dirty="0" smtClean="0"/>
-              <a:t>Memory</a:t>
-            </a:r>
-          </a:p>
-          <a:p>
-            <a:r>
-              <a:rPr lang="en-US" dirty="0" smtClean="0"/>
-              <a:t>Type of </a:t>
-            </a:r>
-            <a:r>
-              <a:rPr lang="en-US" dirty="0" err="1" smtClean="0"/>
-              <a:t>Thresholding</a:t>
-            </a:r>
-            <a:endParaRPr lang="en-US" dirty="0" smtClean="0"/>
-          </a:p>
-          <a:p>
-            <a:endParaRPr lang="en-US" dirty="0"/>
-          </a:p>
-        </p:txBody>
-      </p:sp>
     </p:spTree>
     <p:extLst>
       <p:ext uri="{BB962C8B-B14F-4D97-AF65-F5344CB8AC3E}">
-        <p14:creationId xmlns:p14="http://schemas.microsoft.com/office/powerpoint/2010/main" val="3449039880"/>
+        <p14:creationId xmlns:p14="http://schemas.microsoft.com/office/powerpoint/2010/main" val="1652368456"/>
       </p:ext>
     </p:extLst>
   </p:cSld>
@@ -4696,7 +5356,7 @@
             <a:pPr algn="l"/>
             <a:r>
               <a:rPr lang="en-US" dirty="0" smtClean="0"/>
-              <a:t>Difficulty with Android camera</a:t>
+              <a:t>Application Internals – Bar code reader</a:t>
             </a:r>
           </a:p>
         </p:txBody>
@@ -4798,54 +5458,52 @@
           <a:effectLst/>
         </p:spPr>
         <p:txBody>
-          <a:bodyPr>
-            <a:normAutofit/>
-          </a:bodyPr>
-          <a:lstStyle/>
-          <a:p>
-            <a:r>
-              <a:rPr lang="en-US" dirty="0" smtClean="0"/>
-              <a:t>Camera needs to be retrieved and released</a:t>
-            </a:r>
-          </a:p>
-          <a:p>
-            <a:r>
-              <a:rPr lang="en-US" dirty="0" smtClean="0"/>
-              <a:t>Numerous times release wasn’t called correctly</a:t>
-            </a:r>
-          </a:p>
-          <a:p>
-            <a:r>
-              <a:rPr lang="en-US" dirty="0" smtClean="0"/>
-              <a:t>Starting and Stopping preview</a:t>
-            </a:r>
-          </a:p>
-          <a:p>
-            <a:r>
-              <a:rPr lang="en-US" dirty="0" smtClean="0"/>
-              <a:t>Initialization Camera Properties</a:t>
-            </a:r>
-          </a:p>
-          <a:p>
-            <a:pPr lvl="1"/>
-            <a:r>
-              <a:rPr lang="en-US" dirty="0" smtClean="0"/>
-              <a:t>Out of memory</a:t>
-            </a:r>
-          </a:p>
-          <a:p>
-            <a:pPr lvl="1"/>
-            <a:r>
-              <a:rPr lang="en-US" dirty="0" smtClean="0"/>
-              <a:t>Supported features</a:t>
-            </a:r>
+          <a:bodyPr/>
+          <a:lstStyle/>
+          <a:p>
+            <a:r>
+              <a:rPr lang="en-US" dirty="0" smtClean="0"/>
+              <a:t>Difficulty with Android camera</a:t>
+            </a:r>
+          </a:p>
+          <a:p>
+            <a:r>
+              <a:rPr lang="en-US" dirty="0" smtClean="0"/>
+              <a:t>Picture Quality</a:t>
+            </a:r>
+          </a:p>
+          <a:p>
+            <a:r>
+              <a:rPr lang="en-US" dirty="0" smtClean="0"/>
+              <a:t>Lighting</a:t>
+            </a:r>
+          </a:p>
+          <a:p>
+            <a:r>
+              <a:rPr lang="en-US" dirty="0" smtClean="0"/>
+              <a:t>Memory</a:t>
+            </a:r>
+          </a:p>
+          <a:p>
+            <a:r>
+              <a:rPr lang="en-US" dirty="0" smtClean="0"/>
+              <a:t>Types of </a:t>
+            </a:r>
+            <a:r>
+              <a:rPr lang="en-US" dirty="0" err="1" smtClean="0"/>
+              <a:t>Thresholding</a:t>
+            </a:r>
+            <a:endParaRPr lang="en-US" dirty="0" smtClean="0"/>
+          </a:p>
+          <a:p>
+            <a:endParaRPr lang="en-US" dirty="0"/>
           </a:p>
         </p:txBody>
       </p:sp>
     </p:spTree>
     <p:extLst>
       <p:ext uri="{BB962C8B-B14F-4D97-AF65-F5344CB8AC3E}">
-        <p14:creationId xmlns:p14="http://schemas.microsoft.com/office/powerpoint/2010/main" val="81067878"/>
+        <p14:creationId xmlns:p14="http://schemas.microsoft.com/office/powerpoint/2010/main" val="3449039880"/>
       </p:ext>
     </p:extLst>
   </p:cSld>
@@ -4905,7 +5563,7 @@
             <a:pPr algn="l"/>
             <a:r>
               <a:rPr lang="en-US" dirty="0" smtClean="0"/>
-              <a:t>Picture Quality</a:t>
+              <a:t>Difficulty with Android camera</a:t>
             </a:r>
           </a:p>
         </p:txBody>
@@ -5007,77 +5665,54 @@
           <a:effectLst/>
         </p:spPr>
         <p:txBody>
-          <a:bodyPr/>
-          <a:lstStyle/>
-          <a:p>
-            <a:r>
-              <a:rPr lang="en-US" dirty="0" smtClean="0"/>
-              <a:t>Take picture</a:t>
+          <a:bodyPr>
+            <a:normAutofit/>
+          </a:bodyPr>
+          <a:lstStyle/>
+          <a:p>
+            <a:r>
+              <a:rPr lang="en-US" dirty="0" smtClean="0"/>
+              <a:t>Camera needs to be retrieved and released</a:t>
+            </a:r>
+          </a:p>
+          <a:p>
+            <a:r>
+              <a:rPr lang="en-US" dirty="0" smtClean="0"/>
+              <a:t>Numerous times release wasn’t called correctly</a:t>
+            </a:r>
+          </a:p>
+          <a:p>
+            <a:r>
+              <a:rPr lang="en-US" dirty="0" smtClean="0"/>
+              <a:t>Starting and Stopping preview</a:t>
+            </a:r>
+          </a:p>
+          <a:p>
+            <a:r>
+              <a:rPr lang="en-US" dirty="0" smtClean="0"/>
+              <a:t>Initialization Camera Properties</a:t>
             </a:r>
           </a:p>
           <a:p>
             <a:pPr lvl="1"/>
             <a:r>
               <a:rPr lang="en-US" dirty="0" smtClean="0"/>
-              <a:t>Out of focus</a:t>
+              <a:t>Out of memory</a:t>
             </a:r>
           </a:p>
           <a:p>
             <a:pPr lvl="1"/>
             <a:r>
               <a:rPr lang="en-US" dirty="0" smtClean="0"/>
-              <a:t>Always blurry</a:t>
-            </a:r>
-          </a:p>
-          <a:p>
-            <a:pPr lvl="1"/>
-            <a:r>
-              <a:rPr lang="en-US" dirty="0" smtClean="0"/>
-              <a:t>JPEG default picture quality (settable)</a:t>
-            </a:r>
-          </a:p>
-          <a:p>
-            <a:r>
-              <a:rPr lang="en-US" dirty="0" smtClean="0"/>
-              <a:t>Take next preview</a:t>
-            </a:r>
-          </a:p>
-          <a:p>
-            <a:pPr lvl="1"/>
-            <a:r>
-              <a:rPr lang="en-US" dirty="0" smtClean="0"/>
-              <a:t>Clear</a:t>
-            </a:r>
-          </a:p>
-          <a:p>
-            <a:pPr lvl="1"/>
-            <a:r>
-              <a:rPr lang="en-US" dirty="0" smtClean="0"/>
-              <a:t>Exactly what was seen on preview</a:t>
-            </a:r>
-          </a:p>
-          <a:p>
-            <a:pPr lvl="1"/>
-            <a:r>
-              <a:rPr lang="en-US" dirty="0" smtClean="0"/>
-              <a:t>NC21 </a:t>
-            </a:r>
-            <a:r>
-              <a:rPr lang="en-US" dirty="0" err="1" smtClean="0"/>
-              <a:t>YCrCb</a:t>
-            </a:r>
-            <a:r>
-              <a:rPr lang="en-US" dirty="0" smtClean="0"/>
-              <a:t> default picture quality</a:t>
-            </a:r>
-            <a:endParaRPr lang="en-US" dirty="0"/>
+              <a:t>Supported features</a:t>
+            </a:r>
           </a:p>
         </p:txBody>
       </p:sp>
     </p:spTree>
     <p:extLst>
       <p:ext uri="{BB962C8B-B14F-4D97-AF65-F5344CB8AC3E}">
-        <p14:creationId xmlns:p14="http://schemas.microsoft.com/office/powerpoint/2010/main" val="3221677974"/>
+        <p14:creationId xmlns:p14="http://schemas.microsoft.com/office/powerpoint/2010/main" val="81067878"/>
       </p:ext>
     </p:extLst>
   </p:cSld>
@@ -5137,7 +5772,7 @@
             <a:pPr algn="l"/>
             <a:r>
               <a:rPr lang="en-US" dirty="0" smtClean="0"/>
-              <a:t>Lighting</a:t>
+              <a:t>Picture Quality</a:t>
             </a:r>
           </a:p>
         </p:txBody>
@@ -5244,73 +5879,64 @@
           <a:p>
             <a:r>
               <a:rPr lang="en-US" dirty="0" smtClean="0"/>
-              <a:t>Flash modes</a:t>
+              <a:t>Take picture</a:t>
             </a:r>
           </a:p>
           <a:p>
             <a:pPr lvl="1"/>
             <a:r>
               <a:rPr lang="en-US" dirty="0" smtClean="0"/>
-              <a:t>Torch</a:t>
+              <a:t>Out of focus</a:t>
             </a:r>
           </a:p>
           <a:p>
             <a:pPr lvl="1"/>
             <a:r>
               <a:rPr lang="en-US" dirty="0" smtClean="0"/>
-              <a:t>Macro</a:t>
-            </a:r>
-          </a:p>
-          <a:p>
-            <a:r>
-              <a:rPr lang="en-US" dirty="0" smtClean="0"/>
-              <a:t>Bright spots affected </a:t>
-            </a:r>
-            <a:r>
-              <a:rPr lang="en-US" dirty="0" err="1"/>
-              <a:t>T</a:t>
+              <a:t>Always blurry</a:t>
+            </a:r>
+          </a:p>
+          <a:p>
+            <a:pPr lvl="1"/>
+            <a:r>
+              <a:rPr lang="en-US" dirty="0" smtClean="0"/>
+              <a:t>JPEG default picture quality (settable)</a:t>
+            </a:r>
+          </a:p>
+          <a:p>
+            <a:r>
+              <a:rPr lang="en-US" dirty="0" smtClean="0"/>
+              <a:t>Take next preview</a:t>
+            </a:r>
+          </a:p>
+          <a:p>
+            <a:pPr lvl="1"/>
+            <a:r>
+              <a:rPr lang="en-US" dirty="0" smtClean="0"/>
+              <a:t>Clear</a:t>
+            </a:r>
+          </a:p>
+          <a:p>
+            <a:pPr lvl="1"/>
+            <a:r>
+              <a:rPr lang="en-US" dirty="0" smtClean="0"/>
+              <a:t>Exactly what was seen on preview</a:t>
+            </a:r>
+          </a:p>
+          <a:p>
+            <a:pPr lvl="1"/>
+            <a:r>
+              <a:rPr lang="en-US" dirty="0" smtClean="0"/>
+              <a:t>NC21 </a:t>
             </a:r>
             <a:r>
               <a:rPr lang="en-US" dirty="0" err="1" smtClean="0"/>
-              <a:t>hresholding</a:t>
-            </a:r>
-            <a:endParaRPr lang="en-US" dirty="0" smtClean="0"/>
-          </a:p>
-          <a:p>
-            <a:pPr lvl="1"/>
-            <a:r>
-              <a:rPr lang="en-US" dirty="0" smtClean="0"/>
-              <a:t>Full Image </a:t>
-            </a:r>
-            <a:r>
-              <a:rPr lang="en-US" dirty="0" err="1" smtClean="0"/>
-              <a:t>vs</a:t>
-            </a:r>
-            <a:r>
-              <a:rPr lang="en-US" dirty="0" smtClean="0"/>
-              <a:t> Barcode area </a:t>
-            </a:r>
-            <a:r>
-              <a:rPr lang="en-US" dirty="0" err="1" smtClean="0"/>
-              <a:t>vs</a:t>
-            </a:r>
-            <a:r>
-              <a:rPr lang="en-US" dirty="0" smtClean="0"/>
-              <a:t> Line we care about</a:t>
-            </a:r>
-          </a:p>
-          <a:p>
-            <a:pPr lvl="1"/>
-            <a:r>
-              <a:rPr lang="en-US" dirty="0" err="1" smtClean="0"/>
-              <a:t>Thresholding</a:t>
-            </a:r>
-            <a:r>
-              <a:rPr lang="en-US" dirty="0" smtClean="0"/>
-              <a:t> techniques (Talk about later)</a:t>
-            </a:r>
-          </a:p>
-          <a:p>
+              <a:t>YCrCb</a:t>
+            </a:r>
+            <a:r>
+              <a:rPr lang="en-US" dirty="0" smtClean="0"/>
+              <a:t> default picture quality</a:t>
+            </a:r>
             <a:endParaRPr lang="en-US" dirty="0"/>
           </a:p>
         </p:txBody>
@@ -5318,7 +5944,7 @@
     </p:spTree>
     <p:extLst>
       <p:ext uri="{BB962C8B-B14F-4D97-AF65-F5344CB8AC3E}">
-        <p14:creationId xmlns:p14="http://schemas.microsoft.com/office/powerpoint/2010/main" val="3787305420"/>
+        <p14:creationId xmlns:p14="http://schemas.microsoft.com/office/powerpoint/2010/main" val="3221677974"/>
       </p:ext>
     </p:extLst>
   </p:cSld>
@@ -5378,7 +6004,7 @@
             <a:pPr algn="l"/>
             <a:r>
               <a:rPr lang="en-US" dirty="0" smtClean="0"/>
-              <a:t>Memory</a:t>
+              <a:t>Lighting</a:t>
             </a:r>
           </a:p>
         </p:txBody>
@@ -5485,57 +6111,81 @@
           <a:p>
             <a:r>
               <a:rPr lang="en-US" dirty="0" smtClean="0"/>
-              <a:t>Limited</a:t>
+              <a:t>Flash modes</a:t>
             </a:r>
           </a:p>
           <a:p>
             <a:pPr lvl="1"/>
             <a:r>
               <a:rPr lang="en-US" dirty="0" smtClean="0"/>
-              <a:t>16 MB on 1</a:t>
-            </a:r>
-            <a:r>
-              <a:rPr lang="en-US" baseline="30000" dirty="0" smtClean="0"/>
-              <a:t>st</a:t>
-            </a:r>
-            <a:r>
-              <a:rPr lang="en-US" dirty="0" smtClean="0"/>
-              <a:t> gen phones</a:t>
+              <a:t>Torch</a:t>
             </a:r>
           </a:p>
           <a:p>
             <a:pPr lvl="1"/>
             <a:r>
               <a:rPr lang="en-US" dirty="0" smtClean="0"/>
-              <a:t>24 MB on 2</a:t>
-            </a:r>
-            <a:r>
-              <a:rPr lang="en-US" baseline="30000" dirty="0" smtClean="0"/>
-              <a:t>nd</a:t>
-            </a:r>
-            <a:r>
-              <a:rPr lang="en-US" dirty="0" smtClean="0"/>
-              <a:t> gen phones</a:t>
-            </a:r>
-          </a:p>
-          <a:p>
-            <a:r>
-              <a:rPr lang="en-US" dirty="0" smtClean="0"/>
-              <a:t>8 megapixel image unable to save as an object in memory.</a:t>
-            </a:r>
-          </a:p>
-          <a:p>
-            <a:r>
-              <a:rPr lang="en-US" dirty="0" smtClean="0"/>
-              <a:t>Database storage based on available internal memory.</a:t>
-            </a:r>
+              <a:t>Macro</a:t>
+            </a:r>
+          </a:p>
+          <a:p>
+            <a:r>
+              <a:rPr lang="en-US" dirty="0" smtClean="0"/>
+              <a:t>Bright spots affected </a:t>
+            </a:r>
+            <a:r>
+              <a:rPr lang="en-US" dirty="0" err="1"/>
+              <a:t>T</a:t>
+            </a:r>
+            <a:r>
+              <a:rPr lang="en-US" dirty="0" err="1" smtClean="0"/>
+              <a:t>hresholding</a:t>
+            </a:r>
+            <a:endParaRPr lang="en-US" dirty="0" smtClean="0"/>
+          </a:p>
+          <a:p>
+            <a:pPr lvl="1"/>
+            <a:r>
+              <a:rPr lang="en-US" dirty="0" smtClean="0"/>
+              <a:t>Full Image </a:t>
+            </a:r>
+            <a:r>
+              <a:rPr lang="en-US" dirty="0" err="1" smtClean="0"/>
+              <a:t>vs</a:t>
+            </a:r>
+            <a:r>
+              <a:rPr lang="en-US" dirty="0" smtClean="0"/>
+              <a:t> Barcode area </a:t>
+            </a:r>
+            <a:r>
+              <a:rPr lang="en-US" dirty="0" err="1" smtClean="0"/>
+              <a:t>vs</a:t>
+            </a:r>
+            <a:r>
+              <a:rPr lang="en-US" dirty="0" smtClean="0"/>
+              <a:t> Line we care about</a:t>
+            </a:r>
+          </a:p>
+          <a:p>
+            <a:pPr lvl="1"/>
+            <a:r>
+              <a:rPr lang="en-US" dirty="0" err="1" smtClean="0"/>
+              <a:t>Thresholding</a:t>
+            </a:r>
+            <a:r>
+              <a:rPr lang="en-US" dirty="0" smtClean="0"/>
+              <a:t> techniques (Talk about later)</a:t>
+            </a:r>
+          </a:p>
+          <a:p>
+            <a:endParaRPr lang="en-US" dirty="0"/>
           </a:p>
         </p:txBody>
       </p:sp>
     </p:spTree>
     <p:extLst>
       <p:ext uri="{BB962C8B-B14F-4D97-AF65-F5344CB8AC3E}">
-        <p14:creationId xmlns:p14="http://schemas.microsoft.com/office/powerpoint/2010/main" val="2838528888"/>
+        <p14:creationId xmlns:p14="http://schemas.microsoft.com/office/powerpoint/2010/main" val="3787305420"/>
       </p:ext>
     </p:extLst>
   </p:cSld>
@@ -5595,13 +6245,8 @@
             <a:pPr algn="l"/>
             <a:r>
               <a:rPr lang="en-US" dirty="0" smtClean="0"/>
-              <a:t>Type of </a:t>
-            </a:r>
-            <a:r>
-              <a:rPr lang="en-US" dirty="0" err="1" smtClean="0"/>
-              <a:t>Thresholding</a:t>
-            </a:r>
-            <a:endParaRPr lang="en-US" dirty="0" smtClean="0"/>
+              <a:t>Memory</a:t>
+            </a:r>
           </a:p>
         </p:txBody>
       </p:sp>
@@ -5679,7 +6324,7 @@
         <p:spPr>
           <a:xfrm>
             <a:off x="482600" y="1600200"/>
-            <a:ext cx="8280400" cy="4572000"/>
+            <a:ext cx="8280400" cy="4267200"/>
           </a:xfrm>
           <a:gradFill flip="none" rotWithShape="1">
             <a:gsLst>
@@ -5702,99 +6347,62 @@
           <a:effectLst/>
         </p:spPr>
         <p:txBody>
-          <a:bodyPr>
-            <a:normAutofit fontScale="92500" lnSpcReduction="10000"/>
-          </a:bodyPr>
-          <a:lstStyle/>
-          <a:p>
-            <a:r>
-              <a:rPr lang="en-US" dirty="0" smtClean="0"/>
-              <a:t>Otsu’s </a:t>
-            </a:r>
-            <a:r>
-              <a:rPr lang="en-US" dirty="0" smtClean="0"/>
-              <a:t>Method</a:t>
+          <a:bodyPr/>
+          <a:lstStyle/>
+          <a:p>
+            <a:r>
+              <a:rPr lang="en-US" dirty="0" smtClean="0"/>
+              <a:t>Limited</a:t>
             </a:r>
           </a:p>
           <a:p>
             <a:pPr lvl="1"/>
             <a:r>
               <a:rPr lang="en-US" dirty="0" smtClean="0"/>
-              <a:t>Worked well whole image</a:t>
+              <a:t>16 MB on 1</a:t>
+            </a:r>
+            <a:r>
+              <a:rPr lang="en-US" baseline="30000" dirty="0" smtClean="0"/>
+              <a:t>st</a:t>
+            </a:r>
+            <a:r>
+              <a:rPr lang="en-US" dirty="0" smtClean="0"/>
+              <a:t> gen phones</a:t>
             </a:r>
           </a:p>
           <a:p>
             <a:pPr lvl="1"/>
             <a:r>
               <a:rPr lang="en-US" dirty="0" smtClean="0"/>
-              <a:t>Not so well on a single line (expected)</a:t>
-            </a:r>
-            <a:endParaRPr lang="en-US" dirty="0" smtClean="0"/>
-          </a:p>
-          <a:p>
-            <a:r>
-              <a:rPr lang="en-US" dirty="0" smtClean="0"/>
-              <a:t>Iterative</a:t>
-            </a:r>
-          </a:p>
-          <a:p>
-            <a:pPr lvl="1"/>
-            <a:r>
-              <a:rPr lang="en-US" dirty="0" smtClean="0"/>
-              <a:t>Required an initial start threshold value</a:t>
-            </a:r>
-          </a:p>
-          <a:p>
-            <a:pPr lvl="1"/>
-            <a:r>
-              <a:rPr lang="en-US" dirty="0" smtClean="0"/>
-              <a:t>Always resulted in a local minimum</a:t>
-            </a:r>
-            <a:endParaRPr lang="en-US" dirty="0" smtClean="0"/>
-          </a:p>
-          <a:p>
-            <a:r>
-              <a:rPr lang="en-US" dirty="0" smtClean="0"/>
-              <a:t>Modified</a:t>
-            </a:r>
-          </a:p>
-          <a:p>
-            <a:pPr lvl="1"/>
-            <a:r>
-              <a:rPr lang="en-US" dirty="0" smtClean="0"/>
-              <a:t>Find the first largest peak</a:t>
-            </a:r>
-          </a:p>
-          <a:p>
-            <a:pPr lvl="1"/>
-            <a:r>
-              <a:rPr lang="en-US" dirty="0" smtClean="0"/>
-              <a:t>Find second largest furthest away from first</a:t>
-            </a:r>
-          </a:p>
-          <a:p>
-            <a:pPr lvl="1"/>
-            <a:r>
-              <a:rPr lang="en-US" dirty="0" smtClean="0"/>
-              <a:t>Find a low valley between the two</a:t>
-            </a:r>
-          </a:p>
-          <a:p>
-            <a:pPr lvl="1"/>
-            <a:endParaRPr lang="en-US" dirty="0" smtClean="0"/>
-          </a:p>
-          <a:p>
-            <a:endParaRPr lang="en-US" dirty="0" smtClean="0"/>
-          </a:p>
-          <a:p>
-            <a:endParaRPr lang="en-US" dirty="0"/>
+              <a:t>24 MB on 2</a:t>
+            </a:r>
+            <a:r>
+              <a:rPr lang="en-US" baseline="30000" dirty="0" smtClean="0"/>
+              <a:t>nd</a:t>
+            </a:r>
+            <a:r>
+              <a:rPr lang="en-US" dirty="0" smtClean="0"/>
+              <a:t> gen phones</a:t>
+            </a:r>
+          </a:p>
+          <a:p>
+            <a:r>
+              <a:rPr lang="en-US" dirty="0" smtClean="0"/>
+              <a:t>8 megapixel image unable to save as an object in memory.</a:t>
+            </a:r>
+          </a:p>
+          <a:p>
+            <a:r>
+              <a:rPr lang="en-US" dirty="0" smtClean="0"/>
+              <a:t>Database storage based on available internal memory.</a:t>
+            </a:r>
           </a:p>
         </p:txBody>
       </p:sp>
     </p:spTree>
     <p:extLst>
       <p:ext uri="{BB962C8B-B14F-4D97-AF65-F5344CB8AC3E}">
-        <p14:creationId xmlns:p14="http://schemas.microsoft.com/office/powerpoint/2010/main" val="2308644743"/>
+        <p14:creationId xmlns:p14="http://schemas.microsoft.com/office/powerpoint/2010/main" val="2838528888"/>
       </p:ext>
     </p:extLst>
   </p:cSld>
@@ -5854,60 +6462,13 @@
             <a:pPr algn="l"/>
             <a:r>
               <a:rPr lang="en-US" dirty="0" smtClean="0"/>
-              <a:t>Application Internals - UI</a:t>
-            </a:r>
-          </a:p>
-        </p:txBody>
-      </p:sp>
-      <p:sp>
-        <p:nvSpPr>
-          <p:cNvPr id="1150" name="Content Placeholder 1149"/>
-          <p:cNvSpPr>
-            <a:spLocks noGrp="1"/>
-          </p:cNvSpPr>
-          <p:nvPr>
-            <p:ph idx="1"/>
-          </p:nvPr>
-        </p:nvSpPr>
-        <p:spPr>
-          <a:xfrm>
-            <a:off x="457200" y="1600201"/>
-            <a:ext cx="7848600" cy="4038599"/>
-          </a:xfrm>
-          <a:gradFill flip="none" rotWithShape="1">
-            <a:gsLst>
-              <a:gs pos="66000">
-                <a:schemeClr val="bg1">
-                  <a:lumMod val="65000"/>
-                  <a:alpha val="0"/>
-                </a:schemeClr>
-              </a:gs>
-              <a:gs pos="100000">
-                <a:schemeClr val="bg1">
-                  <a:lumMod val="85000"/>
-                  <a:alpha val="86000"/>
-                </a:schemeClr>
-              </a:gs>
-            </a:gsLst>
-            <a:lin ang="5400000" scaled="1"/>
-            <a:tileRect/>
-          </a:gradFill>
-          <a:effectLst/>
-        </p:spPr>
-        <p:txBody>
-          <a:bodyPr/>
-          <a:lstStyle/>
-          <a:p>
-            <a:r>
-              <a:rPr lang="en-US" dirty="0" smtClean="0"/>
-              <a:t>Talk about views</a:t>
-            </a:r>
-          </a:p>
-          <a:p>
+              <a:t>Types of </a:t>
+            </a:r>
+            <a:r>
+              <a:rPr lang="en-US" dirty="0" err="1" smtClean="0"/>
+              <a:t>Thresholding</a:t>
+            </a:r>
             <a:endParaRPr lang="en-US" dirty="0" smtClean="0"/>
-          </a:p>
-          <a:p>
-            <a:endParaRPr lang="en-US" dirty="0"/>
           </a:p>
         </p:txBody>
       </p:sp>
@@ -5972,10 +6533,129 @@
           </a:p>
         </p:txBody>
       </p:sp>
+      <p:sp>
+        <p:nvSpPr>
+          <p:cNvPr id="12" name="Content Placeholder 1149"/>
+          <p:cNvSpPr>
+            <a:spLocks noGrp="1"/>
+          </p:cNvSpPr>
+          <p:nvPr>
+            <p:ph idx="1"/>
+          </p:nvPr>
+        </p:nvSpPr>
+        <p:spPr>
+          <a:xfrm>
+            <a:off x="482600" y="1600200"/>
+            <a:ext cx="8280400" cy="4572000"/>
+          </a:xfrm>
+          <a:gradFill flip="none" rotWithShape="1">
+            <a:gsLst>
+              <a:gs pos="66000">
+                <a:schemeClr val="bg1">
+                  <a:lumMod val="65000"/>
+                  <a:alpha val="0"/>
+                </a:schemeClr>
+              </a:gs>
+              <a:gs pos="100000">
+                <a:schemeClr val="bg1">
+                  <a:lumMod val="85000"/>
+                  <a:alpha val="86000"/>
+                </a:schemeClr>
+              </a:gs>
+            </a:gsLst>
+            <a:lin ang="5400000" scaled="1"/>
+            <a:tileRect/>
+          </a:gradFill>
+          <a:effectLst/>
+        </p:spPr>
+        <p:txBody>
+          <a:bodyPr>
+            <a:normAutofit fontScale="92500" lnSpcReduction="10000"/>
+          </a:bodyPr>
+          <a:lstStyle/>
+          <a:p>
+            <a:r>
+              <a:rPr lang="en-US" dirty="0" smtClean="0"/>
+              <a:t>Otsu’s Method</a:t>
+            </a:r>
+          </a:p>
+          <a:p>
+            <a:pPr lvl="1"/>
+            <a:r>
+              <a:rPr lang="en-US" dirty="0" smtClean="0"/>
+              <a:t>Worked well whole image</a:t>
+            </a:r>
+          </a:p>
+          <a:p>
+            <a:pPr lvl="1"/>
+            <a:r>
+              <a:rPr lang="en-US" dirty="0" smtClean="0"/>
+              <a:t>Not so well on a single line (expected)</a:t>
+            </a:r>
+          </a:p>
+          <a:p>
+            <a:r>
+              <a:rPr lang="en-US" dirty="0" smtClean="0"/>
+              <a:t>Iterative</a:t>
+            </a:r>
+          </a:p>
+          <a:p>
+            <a:pPr lvl="1"/>
+            <a:r>
+              <a:rPr lang="en-US" dirty="0" smtClean="0"/>
+              <a:t>Required an initial start threshold value</a:t>
+            </a:r>
+          </a:p>
+          <a:p>
+            <a:pPr lvl="1"/>
+            <a:r>
+              <a:rPr lang="en-US" dirty="0" smtClean="0"/>
+              <a:t>Always resulted in a local minimum</a:t>
+            </a:r>
+          </a:p>
+          <a:p>
+            <a:r>
+              <a:rPr lang="en-US" dirty="0" smtClean="0"/>
+              <a:t>Modified</a:t>
+            </a:r>
+          </a:p>
+          <a:p>
+            <a:pPr lvl="1"/>
+            <a:r>
+              <a:rPr lang="en-US" dirty="0" smtClean="0"/>
+              <a:t>Find the first largest peak</a:t>
+            </a:r>
+          </a:p>
+          <a:p>
+            <a:pPr lvl="1"/>
+            <a:r>
+              <a:rPr lang="en-US" dirty="0" smtClean="0"/>
+              <a:t>Find second largest furthest away from first</a:t>
+            </a:r>
+          </a:p>
+          <a:p>
+            <a:pPr lvl="1"/>
+            <a:r>
+              <a:rPr lang="en-US" dirty="0" smtClean="0"/>
+              <a:t>Find a low valley between the two</a:t>
+            </a:r>
+          </a:p>
+          <a:p>
+            <a:pPr lvl="1"/>
+            <a:endParaRPr lang="en-US" dirty="0" smtClean="0"/>
+          </a:p>
+          <a:p>
+            <a:endParaRPr lang="en-US" dirty="0" smtClean="0"/>
+          </a:p>
+          <a:p>
+            <a:endParaRPr lang="en-US" dirty="0"/>
+          </a:p>
+        </p:txBody>
+      </p:sp>
     </p:spTree>
     <p:extLst>
       <p:ext uri="{BB962C8B-B14F-4D97-AF65-F5344CB8AC3E}">
-        <p14:creationId xmlns:p14="http://schemas.microsoft.com/office/powerpoint/2010/main" val="684294254"/>
+        <p14:creationId xmlns:p14="http://schemas.microsoft.com/office/powerpoint/2010/main" val="2308644743"/>
       </p:ext>
     </p:extLst>
   </p:cSld>
@@ -6035,8 +6715,113 @@
             <a:pPr algn="l"/>
             <a:r>
               <a:rPr lang="en-US" dirty="0" smtClean="0"/>
-              <a:t>Demonstration of the Application</a:t>
-            </a:r>
+              <a:t>Application Internals - UI</a:t>
+            </a:r>
+          </a:p>
+        </p:txBody>
+      </p:sp>
+      <p:sp>
+        <p:nvSpPr>
+          <p:cNvPr id="1150" name="Content Placeholder 1149"/>
+          <p:cNvSpPr>
+            <a:spLocks noGrp="1"/>
+          </p:cNvSpPr>
+          <p:nvPr>
+            <p:ph idx="1"/>
+          </p:nvPr>
+        </p:nvSpPr>
+        <p:spPr>
+          <a:xfrm>
+            <a:off x="457200" y="1600201"/>
+            <a:ext cx="7848600" cy="4419599"/>
+          </a:xfrm>
+          <a:gradFill flip="none" rotWithShape="1">
+            <a:gsLst>
+              <a:gs pos="66000">
+                <a:schemeClr val="bg1">
+                  <a:lumMod val="65000"/>
+                  <a:alpha val="0"/>
+                </a:schemeClr>
+              </a:gs>
+              <a:gs pos="100000">
+                <a:schemeClr val="bg1">
+                  <a:lumMod val="85000"/>
+                  <a:alpha val="86000"/>
+                </a:schemeClr>
+              </a:gs>
+            </a:gsLst>
+            <a:lin ang="5400000" scaled="1"/>
+            <a:tileRect/>
+          </a:gradFill>
+          <a:effectLst/>
+        </p:spPr>
+        <p:txBody>
+          <a:bodyPr/>
+          <a:lstStyle/>
+          <a:p>
+            <a:r>
+              <a:rPr lang="en-US" dirty="0" smtClean="0"/>
+              <a:t>Views are containers</a:t>
+            </a:r>
+          </a:p>
+          <a:p>
+            <a:r>
+              <a:rPr lang="en-US" dirty="0" smtClean="0"/>
+              <a:t>Started with using </a:t>
+            </a:r>
+            <a:r>
+              <a:rPr lang="en-US" dirty="0" err="1" smtClean="0"/>
+              <a:t>TableLayout’s</a:t>
+            </a:r>
+            <a:endParaRPr lang="en-US" dirty="0" smtClean="0"/>
+          </a:p>
+          <a:p>
+            <a:pPr lvl="1"/>
+            <a:r>
+              <a:rPr lang="en-US" dirty="0" smtClean="0"/>
+              <a:t>Easy to add new items</a:t>
+            </a:r>
+          </a:p>
+          <a:p>
+            <a:pPr lvl="1"/>
+            <a:r>
+              <a:rPr lang="en-US" dirty="0" smtClean="0"/>
+              <a:t>Can’t be updated dynamically</a:t>
+            </a:r>
+          </a:p>
+          <a:p>
+            <a:r>
+              <a:rPr lang="en-US" dirty="0" smtClean="0"/>
+              <a:t>Switched to </a:t>
+            </a:r>
+            <a:r>
+              <a:rPr lang="en-US" dirty="0" err="1" smtClean="0"/>
+              <a:t>ListView’s</a:t>
+            </a:r>
+            <a:endParaRPr lang="en-US" dirty="0" smtClean="0"/>
+          </a:p>
+          <a:p>
+            <a:pPr lvl="1"/>
+            <a:r>
+              <a:rPr lang="en-US" dirty="0" smtClean="0"/>
+              <a:t>Underlying list adapters allow dynamic change</a:t>
+            </a:r>
+          </a:p>
+          <a:p>
+            <a:pPr lvl="1"/>
+            <a:r>
+              <a:rPr lang="en-US" dirty="0" smtClean="0"/>
+              <a:t>Notifying of a change must happen on UI thread</a:t>
+            </a:r>
+          </a:p>
+          <a:p>
+            <a:endParaRPr lang="en-US" dirty="0" smtClean="0"/>
+          </a:p>
+          <a:p>
+            <a:endParaRPr lang="en-US" dirty="0" smtClean="0"/>
+          </a:p>
+          <a:p>
+            <a:endParaRPr lang="en-US" dirty="0"/>
           </a:p>
         </p:txBody>
       </p:sp>
@@ -6104,7 +6889,7 @@
     </p:spTree>
     <p:extLst>
       <p:ext uri="{BB962C8B-B14F-4D97-AF65-F5344CB8AC3E}">
-        <p14:creationId xmlns:p14="http://schemas.microsoft.com/office/powerpoint/2010/main" val="720003859"/>
+        <p14:creationId xmlns:p14="http://schemas.microsoft.com/office/powerpoint/2010/main" val="684294254"/>
       </p:ext>
     </p:extLst>
   </p:cSld>
@@ -6164,8 +6949,107 @@
             <a:pPr algn="l"/>
             <a:r>
               <a:rPr lang="en-US" dirty="0" smtClean="0"/>
-              <a:t>Questions?</a:t>
-            </a:r>
+              <a:t>Application Internals – Web Services</a:t>
+            </a:r>
+          </a:p>
+        </p:txBody>
+      </p:sp>
+      <p:sp>
+        <p:nvSpPr>
+          <p:cNvPr id="1150" name="Content Placeholder 1149"/>
+          <p:cNvSpPr>
+            <a:spLocks noGrp="1"/>
+          </p:cNvSpPr>
+          <p:nvPr>
+            <p:ph idx="1"/>
+          </p:nvPr>
+        </p:nvSpPr>
+        <p:spPr>
+          <a:xfrm>
+            <a:off x="457200" y="1600201"/>
+            <a:ext cx="7848600" cy="4114799"/>
+          </a:xfrm>
+          <a:gradFill flip="none" rotWithShape="1">
+            <a:gsLst>
+              <a:gs pos="66000">
+                <a:schemeClr val="bg1">
+                  <a:lumMod val="65000"/>
+                  <a:alpha val="0"/>
+                </a:schemeClr>
+              </a:gs>
+              <a:gs pos="100000">
+                <a:schemeClr val="bg1">
+                  <a:lumMod val="85000"/>
+                  <a:alpha val="86000"/>
+                </a:schemeClr>
+              </a:gs>
+            </a:gsLst>
+            <a:lin ang="5400000" scaled="1"/>
+            <a:tileRect/>
+          </a:gradFill>
+          <a:effectLst/>
+        </p:spPr>
+        <p:txBody>
+          <a:bodyPr>
+            <a:normAutofit lnSpcReduction="10000"/>
+          </a:bodyPr>
+          <a:lstStyle/>
+          <a:p>
+            <a:r>
+              <a:rPr lang="en-US" dirty="0" smtClean="0"/>
+              <a:t>Google</a:t>
+            </a:r>
+          </a:p>
+          <a:p>
+            <a:pPr lvl="1"/>
+            <a:r>
+              <a:rPr lang="en-US" dirty="0" smtClean="0"/>
+              <a:t>Original plan</a:t>
+            </a:r>
+          </a:p>
+          <a:p>
+            <a:pPr lvl="1"/>
+            <a:r>
+              <a:rPr lang="en-US" dirty="0" smtClean="0"/>
+              <a:t>Only found shopping related services</a:t>
+            </a:r>
+          </a:p>
+          <a:p>
+            <a:pPr lvl="1"/>
+            <a:r>
+              <a:rPr lang="en-US" dirty="0" smtClean="0"/>
+              <a:t>WS usage cost money</a:t>
+            </a:r>
+          </a:p>
+          <a:p>
+            <a:r>
+              <a:rPr lang="en-US" dirty="0" smtClean="0"/>
+              <a:t>Amazon</a:t>
+            </a:r>
+          </a:p>
+          <a:p>
+            <a:pPr lvl="1"/>
+            <a:r>
+              <a:rPr lang="en-US" dirty="0" smtClean="0"/>
+              <a:t>Original backup plan</a:t>
+            </a:r>
+          </a:p>
+          <a:p>
+            <a:pPr lvl="1"/>
+            <a:r>
+              <a:rPr lang="en-US" dirty="0" smtClean="0"/>
+              <a:t>WS usage cost money</a:t>
+            </a:r>
+          </a:p>
+          <a:p>
+            <a:pPr lvl="1"/>
+            <a:r>
+              <a:rPr lang="en-US" dirty="0" smtClean="0"/>
+              <a:t>TOS</a:t>
+            </a:r>
+          </a:p>
+          <a:p>
+            <a:endParaRPr lang="en-US" dirty="0"/>
           </a:p>
         </p:txBody>
       </p:sp>
@@ -6230,40 +7114,10 @@
           </a:p>
         </p:txBody>
       </p:sp>
-      <p:sp>
-        <p:nvSpPr>
-          <p:cNvPr id="3" name="TextBox 2"/>
-          <p:cNvSpPr txBox="1"/>
-          <p:nvPr/>
-        </p:nvSpPr>
-        <p:spPr>
-          <a:xfrm>
-            <a:off x="3182929" y="2743200"/>
-            <a:ext cx="2752741" cy="769441"/>
-          </a:xfrm>
-          <a:prstGeom prst="rect">
-            <a:avLst/>
-          </a:prstGeom>
-          <a:noFill/>
-        </p:spPr>
-        <p:txBody>
-          <a:bodyPr wrap="none" rtlCol="0">
-            <a:spAutoFit/>
-          </a:bodyPr>
-          <a:lstStyle/>
-          <a:p>
-            <a:r>
-              <a:rPr lang="en-US" sz="4400" dirty="0" smtClean="0"/>
-              <a:t>Questions?</a:t>
-            </a:r>
-            <a:endParaRPr lang="en-US" sz="4400" dirty="0"/>
-          </a:p>
-        </p:txBody>
-      </p:sp>
     </p:spTree>
     <p:extLst>
       <p:ext uri="{BB962C8B-B14F-4D97-AF65-F5344CB8AC3E}">
-        <p14:creationId xmlns:p14="http://schemas.microsoft.com/office/powerpoint/2010/main" val="3038111626"/>
+        <p14:creationId xmlns:p14="http://schemas.microsoft.com/office/powerpoint/2010/main" val="2567534914"/>
       </p:ext>
     </p:extLst>
   </p:cSld>
@@ -6366,13 +7220,23 @@
         </p:spPr>
         <p:txBody>
           <a:bodyPr>
-            <a:normAutofit lnSpcReduction="10000"/>
+            <a:normAutofit fontScale="92500" lnSpcReduction="10000"/>
           </a:bodyPr>
           <a:lstStyle/>
           <a:p>
             <a:r>
-              <a:rPr lang="en-US" dirty="0" smtClean="0"/>
-              <a:t>Reason for choosing this project</a:t>
+              <a:rPr lang="en-US" dirty="0"/>
+              <a:t>Where to find the code</a:t>
+            </a:r>
+          </a:p>
+          <a:p>
+            <a:r>
+              <a:rPr lang="en-US" dirty="0" smtClean="0"/>
+              <a:t>Reason </a:t>
+            </a:r>
+            <a:r>
+              <a:rPr lang="en-US" dirty="0" smtClean="0"/>
+              <a:t>for choosing this project</a:t>
             </a:r>
           </a:p>
           <a:p>
@@ -6414,8 +7278,13 @@
           <a:p>
             <a:r>
               <a:rPr lang="en-US" dirty="0" smtClean="0"/>
-              <a:t>Questions?</a:t>
-            </a:r>
+              <a:t>Questions</a:t>
+            </a:r>
+            <a:r>
+              <a:rPr lang="en-US" dirty="0" smtClean="0"/>
+              <a:t>?</a:t>
+            </a:r>
+            <a:endParaRPr lang="en-US" dirty="0" smtClean="0"/>
           </a:p>
           <a:p>
             <a:endParaRPr lang="en-US" dirty="0"/>
@@ -6522,18 +7391,49 @@
       </p:grpSpPr>
       <p:sp>
         <p:nvSpPr>
-          <p:cNvPr id="4" name="Content Placeholder 1149"/>
-          <p:cNvSpPr>
-            <a:spLocks noGrp="1"/>
-          </p:cNvSpPr>
-          <p:nvPr>
-            <p:ph idx="1"/>
+          <p:cNvPr id="1149" name="Title 1148"/>
+          <p:cNvSpPr>
+            <a:spLocks noGrp="1"/>
+          </p:cNvSpPr>
+          <p:nvPr>
+            <p:ph type="title"/>
           </p:nvPr>
         </p:nvSpPr>
         <p:spPr>
           <a:xfrm>
-            <a:off x="482600" y="1600200"/>
-            <a:ext cx="8280400" cy="4525963"/>
+            <a:off x="457200" y="685800"/>
+            <a:ext cx="8229600" cy="731838"/>
+          </a:xfrm>
+          <a:effectLst/>
+        </p:spPr>
+        <p:txBody>
+          <a:bodyPr>
+            <a:normAutofit fontScale="90000"/>
+          </a:bodyPr>
+          <a:lstStyle/>
+          <a:p>
+            <a:pPr algn="l"/>
+            <a:r>
+              <a:rPr lang="en-US" dirty="0" smtClean="0"/>
+              <a:t>Application Internals – Web Services</a:t>
+            </a:r>
+          </a:p>
+        </p:txBody>
+      </p:sp>
+      <p:sp>
+        <p:nvSpPr>
+          <p:cNvPr id="1150" name="Content Placeholder 1149"/>
+          <p:cNvSpPr>
+            <a:spLocks noGrp="1"/>
+          </p:cNvSpPr>
+          <p:nvPr>
+            <p:ph idx="1"/>
+          </p:nvPr>
+        </p:nvSpPr>
+        <p:spPr>
+          <a:xfrm>
+            <a:off x="457200" y="1600201"/>
+            <a:ext cx="7848600" cy="4495799"/>
           </a:xfrm>
           <a:gradFill flip="none" rotWithShape="1">
             <a:gsLst>
@@ -6556,34 +7456,88 @@
           <a:effectLst/>
         </p:spPr>
         <p:txBody>
-          <a:bodyPr/>
-          <a:lstStyle/>
-          <a:p>
-            <a:r>
-              <a:rPr lang="en-US" dirty="0" smtClean="0"/>
-              <a:t>http://www.barcodeisland.com/upca.phtml</a:t>
-            </a:r>
-          </a:p>
-          <a:p>
-            <a:r>
-              <a:rPr lang="en-US" dirty="0" smtClean="0"/>
-              <a:t>http://www.adams1.com/upccode.html</a:t>
-            </a:r>
-          </a:p>
-          <a:p>
-            <a:r>
-              <a:rPr lang="en-US" dirty="0" smtClean="0"/>
-              <a:t>http://www.softwarepractice.org/wiki/UPC-A_Barcode_Standards</a:t>
-            </a:r>
-          </a:p>
-          <a:p>
+          <a:bodyPr>
+            <a:normAutofit lnSpcReduction="10000"/>
+          </a:bodyPr>
+          <a:lstStyle/>
+          <a:p>
+            <a:r>
+              <a:rPr lang="en-US" dirty="0" err="1"/>
+              <a:t>UPCDatabase</a:t>
+            </a:r>
             <a:endParaRPr lang="en-US" dirty="0"/>
           </a:p>
-        </p:txBody>
-      </p:sp>
-      <p:sp>
-        <p:nvSpPr>
-          <p:cNvPr id="5" name="Round Diagonal Corner Rectangle 4"/>
+          <a:p>
+            <a:pPr lvl="1"/>
+            <a:r>
+              <a:rPr lang="en-US" dirty="0"/>
+              <a:t>Non profit/commercial usage </a:t>
+            </a:r>
+            <a:r>
+              <a:rPr lang="en-US" dirty="0" smtClean="0"/>
+              <a:t>only</a:t>
+            </a:r>
+          </a:p>
+          <a:p>
+            <a:pPr lvl="1"/>
+            <a:r>
+              <a:rPr lang="en-US" dirty="0" smtClean="0"/>
+              <a:t>Does not have everything</a:t>
+            </a:r>
+          </a:p>
+          <a:p>
+            <a:pPr lvl="1"/>
+            <a:r>
+              <a:rPr lang="en-US" dirty="0" smtClean="0"/>
+              <a:t>Only basic information</a:t>
+            </a:r>
+          </a:p>
+          <a:p>
+            <a:pPr lvl="1"/>
+            <a:r>
+              <a:rPr lang="en-US" dirty="0" smtClean="0"/>
+              <a:t>XML RPC</a:t>
+            </a:r>
+          </a:p>
+          <a:p>
+            <a:r>
+              <a:rPr lang="en-US" dirty="0" smtClean="0"/>
+              <a:t>Rotten Tomatoes</a:t>
+            </a:r>
+          </a:p>
+          <a:p>
+            <a:pPr lvl="1"/>
+            <a:r>
+              <a:rPr lang="en-US" dirty="0" smtClean="0"/>
+              <a:t>Title search only</a:t>
+            </a:r>
+          </a:p>
+          <a:p>
+            <a:pPr lvl="1"/>
+            <a:r>
+              <a:rPr lang="en-US" dirty="0" smtClean="0"/>
+              <a:t>No series information</a:t>
+            </a:r>
+          </a:p>
+          <a:p>
+            <a:pPr lvl="1"/>
+            <a:r>
+              <a:rPr lang="en-US" dirty="0" smtClean="0"/>
+              <a:t>Not all information for all movies</a:t>
+            </a:r>
+          </a:p>
+          <a:p>
+            <a:pPr lvl="1"/>
+            <a:endParaRPr lang="en-US" dirty="0" smtClean="0"/>
+          </a:p>
+          <a:p>
+            <a:endParaRPr lang="en-US" dirty="0"/>
+          </a:p>
+        </p:txBody>
+      </p:sp>
+      <p:sp>
+        <p:nvSpPr>
+          <p:cNvPr id="1152" name="Round Diagonal Corner Rectangle 1151"/>
           <p:cNvSpPr/>
           <p:nvPr/>
         </p:nvSpPr>
@@ -6642,42 +7596,10 @@
           </a:p>
         </p:txBody>
       </p:sp>
-      <p:sp>
-        <p:nvSpPr>
-          <p:cNvPr id="6" name="Title 1148"/>
-          <p:cNvSpPr>
-            <a:spLocks noGrp="1"/>
-          </p:cNvSpPr>
-          <p:nvPr>
-            <p:ph type="title"/>
-          </p:nvPr>
-        </p:nvSpPr>
-        <p:spPr>
-          <a:xfrm>
-            <a:off x="457200" y="685800"/>
-            <a:ext cx="8229600" cy="731838"/>
-          </a:xfrm>
-          <a:effectLst/>
-        </p:spPr>
-        <p:txBody>
-          <a:bodyPr>
-            <a:normAutofit fontScale="90000"/>
-          </a:bodyPr>
-          <a:lstStyle/>
-          <a:p>
-            <a:pPr algn="l"/>
-            <a:r>
-              <a:rPr lang="en-US" dirty="0" smtClean="0"/>
-              <a:t>References</a:t>
-            </a:r>
-            <a:endParaRPr lang="en-US" dirty="0"/>
-          </a:p>
-        </p:txBody>
-      </p:sp>
     </p:spTree>
     <p:extLst>
       <p:ext uri="{BB962C8B-B14F-4D97-AF65-F5344CB8AC3E}">
-        <p14:creationId xmlns:p14="http://schemas.microsoft.com/office/powerpoint/2010/main" val="2081771929"/>
+        <p14:creationId xmlns:p14="http://schemas.microsoft.com/office/powerpoint/2010/main" val="2793709723"/>
       </p:ext>
     </p:extLst>
   </p:cSld>
@@ -6694,7 +7616,7 @@
 </p:sld>
 </file>
 
-<file path=ppt/slides/slide3.xml><?xml version="1.0" encoding="utf-8"?>
+<file path=ppt/slides/slide21.xml><?xml version="1.0" encoding="utf-8"?>
 <p:sld xmlns:a="http://schemas.openxmlformats.org/drawingml/2006/main" xmlns:r="http://schemas.openxmlformats.org/officeDocument/2006/relationships" xmlns:p="http://schemas.openxmlformats.org/presentationml/2006/main">
   <p:cSld>
     <p:spTree>
@@ -6713,90 +7635,38 @@
       </p:grpSpPr>
       <p:sp>
         <p:nvSpPr>
-          <p:cNvPr id="4" name="Content Placeholder 1149"/>
-          <p:cNvSpPr>
-            <a:spLocks noGrp="1"/>
-          </p:cNvSpPr>
-          <p:nvPr>
-            <p:ph idx="1"/>
+          <p:cNvPr id="1149" name="Title 1148"/>
+          <p:cNvSpPr>
+            <a:spLocks noGrp="1"/>
+          </p:cNvSpPr>
+          <p:nvPr>
+            <p:ph type="title"/>
           </p:nvPr>
         </p:nvSpPr>
         <p:spPr>
           <a:xfrm>
-            <a:off x="482600" y="1600200"/>
-            <a:ext cx="8280400" cy="4525963"/>
+            <a:off x="457200" y="685800"/>
+            <a:ext cx="8229600" cy="731838"/>
           </a:xfrm>
-          <a:gradFill flip="none" rotWithShape="1">
-            <a:gsLst>
-              <a:gs pos="66000">
-                <a:schemeClr val="bg1">
-                  <a:lumMod val="65000"/>
-                  <a:alpha val="0"/>
-                </a:schemeClr>
-              </a:gs>
-              <a:gs pos="100000">
-                <a:schemeClr val="bg1">
-                  <a:lumMod val="85000"/>
-                  <a:alpha val="86000"/>
-                </a:schemeClr>
-              </a:gs>
-            </a:gsLst>
-            <a:lin ang="5400000" scaled="1"/>
-            <a:tileRect/>
-          </a:gradFill>
           <a:effectLst/>
         </p:spPr>
         <p:txBody>
-          <a:bodyPr/>
-          <a:lstStyle/>
-          <a:p>
-            <a:r>
-              <a:rPr lang="en-US" dirty="0" smtClean="0"/>
-              <a:t>Gain more experience with Android development</a:t>
-            </a:r>
-          </a:p>
-          <a:p>
-            <a:pPr lvl="1"/>
-            <a:r>
-              <a:rPr lang="en-US" dirty="0" smtClean="0"/>
-              <a:t>This includes a different UI layout approach</a:t>
-            </a:r>
-          </a:p>
-          <a:p>
-            <a:pPr lvl="1"/>
-            <a:r>
-              <a:rPr lang="en-US" dirty="0" smtClean="0"/>
-              <a:t>Memory management</a:t>
-            </a:r>
-          </a:p>
-          <a:p>
-            <a:pPr lvl="1"/>
-            <a:r>
-              <a:rPr lang="en-US" dirty="0" smtClean="0"/>
-              <a:t>Accessing remote services</a:t>
-            </a:r>
-          </a:p>
-          <a:p>
-            <a:pPr lvl="1"/>
-            <a:r>
-              <a:rPr lang="en-US" dirty="0" smtClean="0"/>
-              <a:t>Camera usage</a:t>
-            </a:r>
-          </a:p>
-          <a:p>
-            <a:r>
-              <a:rPr lang="en-US" dirty="0" smtClean="0"/>
-              <a:t>Image processing</a:t>
-            </a:r>
-          </a:p>
-          <a:p>
-            <a:endParaRPr lang="en-US" dirty="0"/>
-          </a:p>
-        </p:txBody>
-      </p:sp>
-      <p:sp>
-        <p:nvSpPr>
-          <p:cNvPr id="5" name="Round Diagonal Corner Rectangle 4"/>
+          <a:bodyPr>
+            <a:normAutofit fontScale="90000"/>
+          </a:bodyPr>
+          <a:lstStyle/>
+          <a:p>
+            <a:pPr algn="l"/>
+            <a:r>
+              <a:rPr lang="en-US" dirty="0" smtClean="0"/>
+              <a:t>Demonstration of the Application</a:t>
+            </a:r>
+          </a:p>
+        </p:txBody>
+      </p:sp>
+      <p:sp>
+        <p:nvSpPr>
+          <p:cNvPr id="1152" name="Round Diagonal Corner Rectangle 1151"/>
           <p:cNvSpPr/>
           <p:nvPr/>
         </p:nvSpPr>
@@ -6855,6 +7725,736 @@
           </a:p>
         </p:txBody>
       </p:sp>
+    </p:spTree>
+    <p:extLst>
+      <p:ext uri="{BB962C8B-B14F-4D97-AF65-F5344CB8AC3E}">
+        <p14:creationId xmlns:p14="http://schemas.microsoft.com/office/powerpoint/2010/main" val="720003859"/>
+      </p:ext>
+    </p:extLst>
+  </p:cSld>
+  <p:clrMapOvr>
+    <a:masterClrMapping/>
+  </p:clrMapOvr>
+  <p:timing>
+    <p:tnLst>
+      <p:par>
+        <p:cTn id="1" dur="indefinite" restart="never" nodeType="tmRoot"/>
+      </p:par>
+    </p:tnLst>
+  </p:timing>
+</p:sld>
+</file>
+
+<file path=ppt/slides/slide22.xml><?xml version="1.0" encoding="utf-8"?>
+<p:sld xmlns:a="http://schemas.openxmlformats.org/drawingml/2006/main" xmlns:r="http://schemas.openxmlformats.org/officeDocument/2006/relationships" xmlns:p="http://schemas.openxmlformats.org/presentationml/2006/main">
+  <p:cSld>
+    <p:spTree>
+      <p:nvGrpSpPr>
+        <p:cNvPr id="1" name=""/>
+        <p:cNvGrpSpPr/>
+        <p:nvPr/>
+      </p:nvGrpSpPr>
+      <p:grpSpPr>
+        <a:xfrm>
+          <a:off x="0" y="0"/>
+          <a:ext cx="0" cy="0"/>
+          <a:chOff x="0" y="0"/>
+          <a:chExt cx="0" cy="0"/>
+        </a:xfrm>
+      </p:grpSpPr>
+      <p:sp>
+        <p:nvSpPr>
+          <p:cNvPr id="1149" name="Title 1148"/>
+          <p:cNvSpPr>
+            <a:spLocks noGrp="1"/>
+          </p:cNvSpPr>
+          <p:nvPr>
+            <p:ph type="title"/>
+          </p:nvPr>
+        </p:nvSpPr>
+        <p:spPr>
+          <a:xfrm>
+            <a:off x="457200" y="685800"/>
+            <a:ext cx="8229600" cy="731838"/>
+          </a:xfrm>
+          <a:effectLst/>
+        </p:spPr>
+        <p:txBody>
+          <a:bodyPr>
+            <a:normAutofit fontScale="90000"/>
+          </a:bodyPr>
+          <a:lstStyle/>
+          <a:p>
+            <a:pPr algn="l"/>
+            <a:r>
+              <a:rPr lang="en-US" dirty="0" smtClean="0"/>
+              <a:t>Questions?</a:t>
+            </a:r>
+          </a:p>
+        </p:txBody>
+      </p:sp>
+      <p:sp>
+        <p:nvSpPr>
+          <p:cNvPr id="1152" name="Round Diagonal Corner Rectangle 1151"/>
+          <p:cNvSpPr/>
+          <p:nvPr/>
+        </p:nvSpPr>
+        <p:spPr>
+          <a:xfrm>
+            <a:off x="482600" y="1331383"/>
+            <a:ext cx="8153400" cy="114300"/>
+          </a:xfrm>
+          <a:prstGeom prst="round2DiagRect">
+            <a:avLst>
+              <a:gd name="adj1" fmla="val 50000"/>
+              <a:gd name="adj2" fmla="val 0"/>
+            </a:avLst>
+          </a:prstGeom>
+          <a:solidFill>
+            <a:schemeClr val="tx1"/>
+          </a:solidFill>
+          <a:ln>
+            <a:noFill/>
+          </a:ln>
+          <a:effectLst/>
+          <a:scene3d>
+            <a:camera prst="orthographicFront">
+              <a:rot lat="0" lon="0" rev="0"/>
+            </a:camera>
+            <a:lightRig rig="chilly" dir="t">
+              <a:rot lat="0" lon="0" rev="18480000"/>
+            </a:lightRig>
+          </a:scene3d>
+          <a:sp3d prstMaterial="clear">
+            <a:bevelT h="63500"/>
+          </a:sp3d>
+        </p:spPr>
+        <p:style>
+          <a:lnRef idx="2">
+            <a:schemeClr val="accent1">
+              <a:shade val="50000"/>
+            </a:schemeClr>
+          </a:lnRef>
+          <a:fillRef idx="1">
+            <a:schemeClr val="accent1"/>
+          </a:fillRef>
+          <a:effectRef idx="0">
+            <a:schemeClr val="accent1"/>
+          </a:effectRef>
+          <a:fontRef idx="minor">
+            <a:schemeClr val="lt1"/>
+          </a:fontRef>
+        </p:style>
+        <p:txBody>
+          <a:bodyPr rtlCol="0" anchor="ctr"/>
+          <a:lstStyle/>
+          <a:p>
+            <a:pPr algn="ctr"/>
+            <a:endParaRPr lang="en-US"/>
+          </a:p>
+        </p:txBody>
+      </p:sp>
+      <p:sp>
+        <p:nvSpPr>
+          <p:cNvPr id="3" name="TextBox 2"/>
+          <p:cNvSpPr txBox="1"/>
+          <p:nvPr/>
+        </p:nvSpPr>
+        <p:spPr>
+          <a:xfrm>
+            <a:off x="3182929" y="2743200"/>
+            <a:ext cx="2752741" cy="769441"/>
+          </a:xfrm>
+          <a:prstGeom prst="rect">
+            <a:avLst/>
+          </a:prstGeom>
+          <a:noFill/>
+        </p:spPr>
+        <p:txBody>
+          <a:bodyPr wrap="none" rtlCol="0">
+            <a:spAutoFit/>
+          </a:bodyPr>
+          <a:lstStyle/>
+          <a:p>
+            <a:r>
+              <a:rPr lang="en-US" sz="4400" dirty="0" smtClean="0"/>
+              <a:t>Questions?</a:t>
+            </a:r>
+            <a:endParaRPr lang="en-US" sz="4400" dirty="0"/>
+          </a:p>
+        </p:txBody>
+      </p:sp>
+    </p:spTree>
+    <p:extLst>
+      <p:ext uri="{BB962C8B-B14F-4D97-AF65-F5344CB8AC3E}">
+        <p14:creationId xmlns:p14="http://schemas.microsoft.com/office/powerpoint/2010/main" val="3038111626"/>
+      </p:ext>
+    </p:extLst>
+  </p:cSld>
+  <p:clrMapOvr>
+    <a:masterClrMapping/>
+  </p:clrMapOvr>
+  <p:timing>
+    <p:tnLst>
+      <p:par>
+        <p:cTn id="1" dur="indefinite" restart="never" nodeType="tmRoot"/>
+      </p:par>
+    </p:tnLst>
+  </p:timing>
+</p:sld>
+</file>
+
+<file path=ppt/slides/slide23.xml><?xml version="1.0" encoding="utf-8"?>
+<p:sld xmlns:a="http://schemas.openxmlformats.org/drawingml/2006/main" xmlns:r="http://schemas.openxmlformats.org/officeDocument/2006/relationships" xmlns:p="http://schemas.openxmlformats.org/presentationml/2006/main">
+  <p:cSld>
+    <p:spTree>
+      <p:nvGrpSpPr>
+        <p:cNvPr id="1" name=""/>
+        <p:cNvGrpSpPr/>
+        <p:nvPr/>
+      </p:nvGrpSpPr>
+      <p:grpSpPr>
+        <a:xfrm>
+          <a:off x="0" y="0"/>
+          <a:ext cx="0" cy="0"/>
+          <a:chOff x="0" y="0"/>
+          <a:chExt cx="0" cy="0"/>
+        </a:xfrm>
+      </p:grpSpPr>
+      <p:sp>
+        <p:nvSpPr>
+          <p:cNvPr id="4" name="Content Placeholder 1149"/>
+          <p:cNvSpPr>
+            <a:spLocks noGrp="1"/>
+          </p:cNvSpPr>
+          <p:nvPr>
+            <p:ph idx="1"/>
+          </p:nvPr>
+        </p:nvSpPr>
+        <p:spPr>
+          <a:xfrm>
+            <a:off x="482600" y="1600200"/>
+            <a:ext cx="8280400" cy="4525963"/>
+          </a:xfrm>
+          <a:gradFill flip="none" rotWithShape="1">
+            <a:gsLst>
+              <a:gs pos="66000">
+                <a:schemeClr val="bg1">
+                  <a:lumMod val="65000"/>
+                  <a:alpha val="0"/>
+                </a:schemeClr>
+              </a:gs>
+              <a:gs pos="100000">
+                <a:schemeClr val="bg1">
+                  <a:lumMod val="85000"/>
+                  <a:alpha val="86000"/>
+                </a:schemeClr>
+              </a:gs>
+            </a:gsLst>
+            <a:lin ang="5400000" scaled="1"/>
+            <a:tileRect/>
+          </a:gradFill>
+          <a:effectLst/>
+        </p:spPr>
+        <p:txBody>
+          <a:bodyPr/>
+          <a:lstStyle/>
+          <a:p>
+            <a:r>
+              <a:rPr lang="en-US" sz="2800" dirty="0" smtClean="0"/>
+              <a:t>http://www.barcodeisland.com/upca.phtml</a:t>
+            </a:r>
+          </a:p>
+          <a:p>
+            <a:r>
+              <a:rPr lang="en-US" sz="2800" dirty="0" smtClean="0"/>
+              <a:t>http://www.adams1.com/upccode.html</a:t>
+            </a:r>
+          </a:p>
+          <a:p>
+            <a:r>
+              <a:rPr lang="en-US" sz="2800" dirty="0" smtClean="0"/>
+              <a:t>http://</a:t>
+            </a:r>
+            <a:r>
+              <a:rPr lang="en-US" sz="2800" dirty="0" smtClean="0"/>
+              <a:t>www.softwarepractice.org/wiki/UPC-A_Barcode_Standards</a:t>
+            </a:r>
+          </a:p>
+          <a:p>
+            <a:r>
+              <a:rPr lang="en-US" sz="2800" dirty="0"/>
+              <a:t>http://www.free-power-point-templates.com/cinematography-powerpoint-template/</a:t>
+            </a:r>
+            <a:endParaRPr lang="en-US" sz="2800" dirty="0" smtClean="0"/>
+          </a:p>
+          <a:p>
+            <a:endParaRPr lang="en-US" dirty="0"/>
+          </a:p>
+        </p:txBody>
+      </p:sp>
+      <p:sp>
+        <p:nvSpPr>
+          <p:cNvPr id="5" name="Round Diagonal Corner Rectangle 4"/>
+          <p:cNvSpPr/>
+          <p:nvPr/>
+        </p:nvSpPr>
+        <p:spPr>
+          <a:xfrm>
+            <a:off x="482600" y="1331383"/>
+            <a:ext cx="8153400" cy="114300"/>
+          </a:xfrm>
+          <a:prstGeom prst="round2DiagRect">
+            <a:avLst>
+              <a:gd name="adj1" fmla="val 50000"/>
+              <a:gd name="adj2" fmla="val 0"/>
+            </a:avLst>
+          </a:prstGeom>
+          <a:solidFill>
+            <a:schemeClr val="tx1"/>
+          </a:solidFill>
+          <a:ln>
+            <a:noFill/>
+          </a:ln>
+          <a:effectLst/>
+          <a:scene3d>
+            <a:camera prst="orthographicFront">
+              <a:rot lat="0" lon="0" rev="0"/>
+            </a:camera>
+            <a:lightRig rig="chilly" dir="t">
+              <a:rot lat="0" lon="0" rev="18480000"/>
+            </a:lightRig>
+          </a:scene3d>
+          <a:sp3d prstMaterial="clear">
+            <a:bevelT h="63500"/>
+          </a:sp3d>
+        </p:spPr>
+        <p:style>
+          <a:lnRef idx="2">
+            <a:schemeClr val="accent1">
+              <a:shade val="50000"/>
+            </a:schemeClr>
+          </a:lnRef>
+          <a:fillRef idx="1">
+            <a:schemeClr val="accent1"/>
+          </a:fillRef>
+          <a:effectRef idx="0">
+            <a:schemeClr val="accent1"/>
+          </a:effectRef>
+          <a:fontRef idx="minor">
+            <a:schemeClr val="lt1"/>
+          </a:fontRef>
+        </p:style>
+        <p:txBody>
+          <a:bodyPr rtlCol="0" anchor="ctr"/>
+          <a:lstStyle/>
+          <a:p>
+            <a:pPr algn="ctr"/>
+            <a:endParaRPr lang="en-US"/>
+          </a:p>
+        </p:txBody>
+      </p:sp>
+      <p:sp>
+        <p:nvSpPr>
+          <p:cNvPr id="6" name="Title 1148"/>
+          <p:cNvSpPr>
+            <a:spLocks noGrp="1"/>
+          </p:cNvSpPr>
+          <p:nvPr>
+            <p:ph type="title"/>
+          </p:nvPr>
+        </p:nvSpPr>
+        <p:spPr>
+          <a:xfrm>
+            <a:off x="457200" y="685800"/>
+            <a:ext cx="8229600" cy="731838"/>
+          </a:xfrm>
+          <a:effectLst/>
+        </p:spPr>
+        <p:txBody>
+          <a:bodyPr>
+            <a:normAutofit fontScale="90000"/>
+          </a:bodyPr>
+          <a:lstStyle/>
+          <a:p>
+            <a:pPr algn="l"/>
+            <a:r>
+              <a:rPr lang="en-US" dirty="0" smtClean="0"/>
+              <a:t>References</a:t>
+            </a:r>
+            <a:endParaRPr lang="en-US" dirty="0"/>
+          </a:p>
+        </p:txBody>
+      </p:sp>
+    </p:spTree>
+    <p:extLst>
+      <p:ext uri="{BB962C8B-B14F-4D97-AF65-F5344CB8AC3E}">
+        <p14:creationId xmlns:p14="http://schemas.microsoft.com/office/powerpoint/2010/main" val="2081771929"/>
+      </p:ext>
+    </p:extLst>
+  </p:cSld>
+  <p:clrMapOvr>
+    <a:masterClrMapping/>
+  </p:clrMapOvr>
+  <p:timing>
+    <p:tnLst>
+      <p:par>
+        <p:cTn id="1" dur="indefinite" restart="never" nodeType="tmRoot"/>
+      </p:par>
+    </p:tnLst>
+  </p:timing>
+</p:sld>
+</file>
+
+<file path=ppt/slides/slide3.xml><?xml version="1.0" encoding="utf-8"?>
+<p:sld xmlns:a="http://schemas.openxmlformats.org/drawingml/2006/main" xmlns:r="http://schemas.openxmlformats.org/officeDocument/2006/relationships" xmlns:p="http://schemas.openxmlformats.org/presentationml/2006/main">
+  <p:cSld>
+    <p:spTree>
+      <p:nvGrpSpPr>
+        <p:cNvPr id="1" name=""/>
+        <p:cNvGrpSpPr/>
+        <p:nvPr/>
+      </p:nvGrpSpPr>
+      <p:grpSpPr>
+        <a:xfrm>
+          <a:off x="0" y="0"/>
+          <a:ext cx="0" cy="0"/>
+          <a:chOff x="0" y="0"/>
+          <a:chExt cx="0" cy="0"/>
+        </a:xfrm>
+      </p:grpSpPr>
+      <p:sp>
+        <p:nvSpPr>
+          <p:cNvPr id="4" name="Content Placeholder 1149"/>
+          <p:cNvSpPr>
+            <a:spLocks noGrp="1"/>
+          </p:cNvSpPr>
+          <p:nvPr>
+            <p:ph idx="1"/>
+          </p:nvPr>
+        </p:nvSpPr>
+        <p:spPr>
+          <a:xfrm>
+            <a:off x="482600" y="1600200"/>
+            <a:ext cx="8280400" cy="4525963"/>
+          </a:xfrm>
+          <a:gradFill flip="none" rotWithShape="1">
+            <a:gsLst>
+              <a:gs pos="66000">
+                <a:schemeClr val="bg1">
+                  <a:lumMod val="65000"/>
+                  <a:alpha val="0"/>
+                </a:schemeClr>
+              </a:gs>
+              <a:gs pos="100000">
+                <a:schemeClr val="bg1">
+                  <a:lumMod val="85000"/>
+                  <a:alpha val="86000"/>
+                </a:schemeClr>
+              </a:gs>
+            </a:gsLst>
+            <a:lin ang="5400000" scaled="1"/>
+            <a:tileRect/>
+          </a:gradFill>
+          <a:effectLst/>
+        </p:spPr>
+        <p:txBody>
+          <a:bodyPr/>
+          <a:lstStyle/>
+          <a:p>
+            <a:r>
+              <a:rPr lang="en-US" dirty="0" err="1" smtClean="0"/>
+              <a:t>Github</a:t>
+            </a:r>
+            <a:endParaRPr lang="en-US" dirty="0" smtClean="0"/>
+          </a:p>
+          <a:p>
+            <a:pPr lvl="1"/>
+            <a:r>
+              <a:rPr lang="en-US" sz="2400" dirty="0"/>
+              <a:t>https://github.com/pintodragon/CS598MovieCatalog</a:t>
+            </a:r>
+            <a:endParaRPr lang="en-US" sz="2400" dirty="0" smtClean="0"/>
+          </a:p>
+          <a:p>
+            <a:endParaRPr lang="en-US" dirty="0"/>
+          </a:p>
+        </p:txBody>
+      </p:sp>
+      <p:sp>
+        <p:nvSpPr>
+          <p:cNvPr id="5" name="Round Diagonal Corner Rectangle 4"/>
+          <p:cNvSpPr/>
+          <p:nvPr/>
+        </p:nvSpPr>
+        <p:spPr>
+          <a:xfrm>
+            <a:off x="482600" y="1331383"/>
+            <a:ext cx="8153400" cy="114300"/>
+          </a:xfrm>
+          <a:prstGeom prst="round2DiagRect">
+            <a:avLst>
+              <a:gd name="adj1" fmla="val 50000"/>
+              <a:gd name="adj2" fmla="val 0"/>
+            </a:avLst>
+          </a:prstGeom>
+          <a:solidFill>
+            <a:schemeClr val="tx1"/>
+          </a:solidFill>
+          <a:ln>
+            <a:noFill/>
+          </a:ln>
+          <a:effectLst/>
+          <a:scene3d>
+            <a:camera prst="orthographicFront">
+              <a:rot lat="0" lon="0" rev="0"/>
+            </a:camera>
+            <a:lightRig rig="chilly" dir="t">
+              <a:rot lat="0" lon="0" rev="18480000"/>
+            </a:lightRig>
+          </a:scene3d>
+          <a:sp3d prstMaterial="clear">
+            <a:bevelT h="63500"/>
+          </a:sp3d>
+        </p:spPr>
+        <p:style>
+          <a:lnRef idx="2">
+            <a:schemeClr val="accent1">
+              <a:shade val="50000"/>
+            </a:schemeClr>
+          </a:lnRef>
+          <a:fillRef idx="1">
+            <a:schemeClr val="accent1"/>
+          </a:fillRef>
+          <a:effectRef idx="0">
+            <a:schemeClr val="accent1"/>
+          </a:effectRef>
+          <a:fontRef idx="minor">
+            <a:schemeClr val="lt1"/>
+          </a:fontRef>
+        </p:style>
+        <p:txBody>
+          <a:bodyPr rtlCol="0" anchor="ctr"/>
+          <a:lstStyle/>
+          <a:p>
+            <a:pPr algn="ctr"/>
+            <a:endParaRPr lang="en-US"/>
+          </a:p>
+        </p:txBody>
+      </p:sp>
+      <p:sp>
+        <p:nvSpPr>
+          <p:cNvPr id="6" name="Title 1148"/>
+          <p:cNvSpPr>
+            <a:spLocks noGrp="1"/>
+          </p:cNvSpPr>
+          <p:nvPr>
+            <p:ph type="title"/>
+          </p:nvPr>
+        </p:nvSpPr>
+        <p:spPr>
+          <a:xfrm>
+            <a:off x="457200" y="685800"/>
+            <a:ext cx="8229600" cy="731838"/>
+          </a:xfrm>
+          <a:effectLst/>
+        </p:spPr>
+        <p:txBody>
+          <a:bodyPr>
+            <a:normAutofit fontScale="90000"/>
+          </a:bodyPr>
+          <a:lstStyle/>
+          <a:p>
+            <a:pPr algn="l"/>
+            <a:r>
+              <a:rPr lang="en-US" dirty="0" smtClean="0"/>
+              <a:t>Where to find the code</a:t>
+            </a:r>
+            <a:endParaRPr lang="en-US" dirty="0"/>
+          </a:p>
+        </p:txBody>
+      </p:sp>
+    </p:spTree>
+    <p:extLst>
+      <p:ext uri="{BB962C8B-B14F-4D97-AF65-F5344CB8AC3E}">
+        <p14:creationId xmlns:p14="http://schemas.microsoft.com/office/powerpoint/2010/main" val="3340961372"/>
+      </p:ext>
+    </p:extLst>
+  </p:cSld>
+  <p:clrMapOvr>
+    <a:masterClrMapping/>
+  </p:clrMapOvr>
+  <p:timing>
+    <p:tnLst>
+      <p:par>
+        <p:cTn id="1" dur="indefinite" restart="never" nodeType="tmRoot"/>
+      </p:par>
+    </p:tnLst>
+  </p:timing>
+</p:sld>
+</file>
+
+<file path=ppt/slides/slide4.xml><?xml version="1.0" encoding="utf-8"?>
+<p:sld xmlns:a="http://schemas.openxmlformats.org/drawingml/2006/main" xmlns:r="http://schemas.openxmlformats.org/officeDocument/2006/relationships" xmlns:p="http://schemas.openxmlformats.org/presentationml/2006/main">
+  <p:cSld>
+    <p:spTree>
+      <p:nvGrpSpPr>
+        <p:cNvPr id="1" name=""/>
+        <p:cNvGrpSpPr/>
+        <p:nvPr/>
+      </p:nvGrpSpPr>
+      <p:grpSpPr>
+        <a:xfrm>
+          <a:off x="0" y="0"/>
+          <a:ext cx="0" cy="0"/>
+          <a:chOff x="0" y="0"/>
+          <a:chExt cx="0" cy="0"/>
+        </a:xfrm>
+      </p:grpSpPr>
+      <p:sp>
+        <p:nvSpPr>
+          <p:cNvPr id="4" name="Content Placeholder 1149"/>
+          <p:cNvSpPr>
+            <a:spLocks noGrp="1"/>
+          </p:cNvSpPr>
+          <p:nvPr>
+            <p:ph idx="1"/>
+          </p:nvPr>
+        </p:nvSpPr>
+        <p:spPr>
+          <a:xfrm>
+            <a:off x="482600" y="1600200"/>
+            <a:ext cx="8280400" cy="4525963"/>
+          </a:xfrm>
+          <a:gradFill flip="none" rotWithShape="1">
+            <a:gsLst>
+              <a:gs pos="66000">
+                <a:schemeClr val="bg1">
+                  <a:lumMod val="65000"/>
+                  <a:alpha val="0"/>
+                </a:schemeClr>
+              </a:gs>
+              <a:gs pos="100000">
+                <a:schemeClr val="bg1">
+                  <a:lumMod val="85000"/>
+                  <a:alpha val="86000"/>
+                </a:schemeClr>
+              </a:gs>
+            </a:gsLst>
+            <a:lin ang="5400000" scaled="1"/>
+            <a:tileRect/>
+          </a:gradFill>
+          <a:effectLst/>
+        </p:spPr>
+        <p:txBody>
+          <a:bodyPr/>
+          <a:lstStyle/>
+          <a:p>
+            <a:r>
+              <a:rPr lang="en-US" dirty="0" smtClean="0"/>
+              <a:t>Gain more experience with Android development</a:t>
+            </a:r>
+          </a:p>
+          <a:p>
+            <a:pPr lvl="1"/>
+            <a:r>
+              <a:rPr lang="en-US" dirty="0" smtClean="0"/>
+              <a:t>This includes a different UI layout approach</a:t>
+            </a:r>
+          </a:p>
+          <a:p>
+            <a:pPr lvl="1"/>
+            <a:r>
+              <a:rPr lang="en-US" dirty="0" smtClean="0"/>
+              <a:t>Memory management</a:t>
+            </a:r>
+          </a:p>
+          <a:p>
+            <a:pPr lvl="1"/>
+            <a:r>
+              <a:rPr lang="en-US" dirty="0" smtClean="0"/>
+              <a:t>Accessing remote services</a:t>
+            </a:r>
+          </a:p>
+          <a:p>
+            <a:pPr lvl="1"/>
+            <a:r>
+              <a:rPr lang="en-US" dirty="0" smtClean="0"/>
+              <a:t>Camera usage</a:t>
+            </a:r>
+          </a:p>
+          <a:p>
+            <a:r>
+              <a:rPr lang="en-US" dirty="0" smtClean="0"/>
+              <a:t>Image processing</a:t>
+            </a:r>
+          </a:p>
+          <a:p>
+            <a:endParaRPr lang="en-US" dirty="0"/>
+          </a:p>
+        </p:txBody>
+      </p:sp>
+      <p:sp>
+        <p:nvSpPr>
+          <p:cNvPr id="5" name="Round Diagonal Corner Rectangle 4"/>
+          <p:cNvSpPr/>
+          <p:nvPr/>
+        </p:nvSpPr>
+        <p:spPr>
+          <a:xfrm>
+            <a:off x="482600" y="1331383"/>
+            <a:ext cx="8153400" cy="114300"/>
+          </a:xfrm>
+          <a:prstGeom prst="round2DiagRect">
+            <a:avLst>
+              <a:gd name="adj1" fmla="val 50000"/>
+              <a:gd name="adj2" fmla="val 0"/>
+            </a:avLst>
+          </a:prstGeom>
+          <a:solidFill>
+            <a:schemeClr val="tx1"/>
+          </a:solidFill>
+          <a:ln>
+            <a:noFill/>
+          </a:ln>
+          <a:effectLst/>
+          <a:scene3d>
+            <a:camera prst="orthographicFront">
+              <a:rot lat="0" lon="0" rev="0"/>
+            </a:camera>
+            <a:lightRig rig="chilly" dir="t">
+              <a:rot lat="0" lon="0" rev="18480000"/>
+            </a:lightRig>
+          </a:scene3d>
+          <a:sp3d prstMaterial="clear">
+            <a:bevelT h="63500"/>
+          </a:sp3d>
+        </p:spPr>
+        <p:style>
+          <a:lnRef idx="2">
+            <a:schemeClr val="accent1">
+              <a:shade val="50000"/>
+            </a:schemeClr>
+          </a:lnRef>
+          <a:fillRef idx="1">
+            <a:schemeClr val="accent1"/>
+          </a:fillRef>
+          <a:effectRef idx="0">
+            <a:schemeClr val="accent1"/>
+          </a:effectRef>
+          <a:fontRef idx="minor">
+            <a:schemeClr val="lt1"/>
+          </a:fontRef>
+        </p:style>
+        <p:txBody>
+          <a:bodyPr rtlCol="0" anchor="ctr"/>
+          <a:lstStyle/>
+          <a:p>
+            <a:pPr algn="ctr"/>
+            <a:endParaRPr lang="en-US"/>
+          </a:p>
+        </p:txBody>
+      </p:sp>
       <p:sp>
         <p:nvSpPr>
           <p:cNvPr id="6" name="Title 1148"/>
@@ -6907,7 +8507,7 @@
 </p:sld>
 </file>
 
-<file path=ppt/slides/slide4.xml><?xml version="1.0" encoding="utf-8"?>
+<file path=ppt/slides/slide5.xml><?xml version="1.0" encoding="utf-8"?>
 <p:sld xmlns:a="http://schemas.openxmlformats.org/drawingml/2006/main" xmlns:r="http://schemas.openxmlformats.org/officeDocument/2006/relationships" xmlns:p="http://schemas.openxmlformats.org/presentationml/2006/main">
   <p:cSld>
     <p:spTree>
@@ -7159,7 +8759,7 @@
 </p:sld>
 </file>
 
-<file path=ppt/slides/slide5.xml><?xml version="1.0" encoding="utf-8"?>
+<file path=ppt/slides/slide6.xml><?xml version="1.0" encoding="utf-8"?>
 <p:sld xmlns:a="http://schemas.openxmlformats.org/drawingml/2006/main" xmlns:r="http://schemas.openxmlformats.org/officeDocument/2006/relationships" xmlns:p="http://schemas.openxmlformats.org/presentationml/2006/main">
   <p:cSld>
     <p:spTree>
@@ -7381,7 +8981,7 @@
 </p:sld>
 </file>
 
-<file path=ppt/slides/slide6.xml><?xml version="1.0" encoding="utf-8"?>
+<file path=ppt/slides/slide7.xml><?xml version="1.0" encoding="utf-8"?>
 <p:sld xmlns:a="http://schemas.openxmlformats.org/drawingml/2006/main" xmlns:r="http://schemas.openxmlformats.org/officeDocument/2006/relationships" xmlns:p="http://schemas.openxmlformats.org/presentationml/2006/main">
   <p:cSld>
     <p:spTree>
@@ -7668,7 +9268,7 @@
 </p:sld>
 </file>
 
-<file path=ppt/slides/slide7.xml><?xml version="1.0" encoding="utf-8"?>
+<file path=ppt/slides/slide8.xml><?xml version="1.0" encoding="utf-8"?>
 <p:sld xmlns:a="http://schemas.openxmlformats.org/drawingml/2006/main" xmlns:r="http://schemas.openxmlformats.org/officeDocument/2006/relationships" xmlns:p="http://schemas.openxmlformats.org/presentationml/2006/main">
   <p:cSld>
     <p:spTree>
@@ -8047,7 +9647,7 @@
 </p:sld>
 </file>
 
-<file path=ppt/slides/slide8.xml><?xml version="1.0" encoding="utf-8"?>
+<file path=ppt/slides/slide9.xml><?xml version="1.0" encoding="utf-8"?>
 <p:sld xmlns:a="http://schemas.openxmlformats.org/drawingml/2006/main" xmlns:r="http://schemas.openxmlformats.org/officeDocument/2006/relationships" xmlns:p="http://schemas.openxmlformats.org/presentationml/2006/main">
   <p:cSld>
     <p:spTree>
@@ -8959,555 +10559,6 @@
 </p:sld>
 </file>
 
-<file path=ppt/slides/slide9.xml><?xml version="1.0" encoding="utf-8"?>
-<p:sld xmlns:a="http://schemas.openxmlformats.org/drawingml/2006/main" xmlns:r="http://schemas.openxmlformats.org/officeDocument/2006/relationships" xmlns:p="http://schemas.openxmlformats.org/presentationml/2006/main">
-  <p:cSld>
-    <p:spTree>
-      <p:nvGrpSpPr>
-        <p:cNvPr id="1" name=""/>
-        <p:cNvGrpSpPr/>
-        <p:nvPr/>
-      </p:nvGrpSpPr>
-      <p:grpSpPr>
-        <a:xfrm>
-          <a:off x="0" y="0"/>
-          <a:ext cx="0" cy="0"/>
-          <a:chOff x="0" y="0"/>
-          <a:chExt cx="0" cy="0"/>
-        </a:xfrm>
-      </p:grpSpPr>
-      <p:sp>
-        <p:nvSpPr>
-          <p:cNvPr id="1149" name="Title 1148"/>
-          <p:cNvSpPr>
-            <a:spLocks noGrp="1"/>
-          </p:cNvSpPr>
-          <p:nvPr>
-            <p:ph type="title"/>
-          </p:nvPr>
-        </p:nvSpPr>
-        <p:spPr>
-          <a:xfrm>
-            <a:off x="457200" y="685800"/>
-            <a:ext cx="8229600" cy="731838"/>
-          </a:xfrm>
-          <a:effectLst/>
-        </p:spPr>
-        <p:txBody>
-          <a:bodyPr>
-            <a:normAutofit fontScale="90000"/>
-          </a:bodyPr>
-          <a:lstStyle/>
-          <a:p>
-            <a:pPr algn="l"/>
-            <a:r>
-              <a:rPr lang="en-US" dirty="0" smtClean="0"/>
-              <a:t>Reading UPC Barcode Check Digit</a:t>
-            </a:r>
-          </a:p>
-        </p:txBody>
-      </p:sp>
-      <p:sp>
-        <p:nvSpPr>
-          <p:cNvPr id="1152" name="Round Diagonal Corner Rectangle 1151"/>
-          <p:cNvSpPr/>
-          <p:nvPr/>
-        </p:nvSpPr>
-        <p:spPr>
-          <a:xfrm>
-            <a:off x="482600" y="1331383"/>
-            <a:ext cx="8153400" cy="114300"/>
-          </a:xfrm>
-          <a:prstGeom prst="round2DiagRect">
-            <a:avLst>
-              <a:gd name="adj1" fmla="val 50000"/>
-              <a:gd name="adj2" fmla="val 0"/>
-            </a:avLst>
-          </a:prstGeom>
-          <a:solidFill>
-            <a:schemeClr val="tx1"/>
-          </a:solidFill>
-          <a:ln>
-            <a:noFill/>
-          </a:ln>
-          <a:effectLst/>
-          <a:scene3d>
-            <a:camera prst="orthographicFront">
-              <a:rot lat="0" lon="0" rev="0"/>
-            </a:camera>
-            <a:lightRig rig="chilly" dir="t">
-              <a:rot lat="0" lon="0" rev="18480000"/>
-            </a:lightRig>
-          </a:scene3d>
-          <a:sp3d prstMaterial="clear">
-            <a:bevelT h="63500"/>
-          </a:sp3d>
-        </p:spPr>
-        <p:style>
-          <a:lnRef idx="2">
-            <a:schemeClr val="accent1">
-              <a:shade val="50000"/>
-            </a:schemeClr>
-          </a:lnRef>
-          <a:fillRef idx="1">
-            <a:schemeClr val="accent1"/>
-          </a:fillRef>
-          <a:effectRef idx="0">
-            <a:schemeClr val="accent1"/>
-          </a:effectRef>
-          <a:fontRef idx="minor">
-            <a:schemeClr val="lt1"/>
-          </a:fontRef>
-        </p:style>
-        <p:txBody>
-          <a:bodyPr rtlCol="0" anchor="ctr"/>
-          <a:lstStyle/>
-          <a:p>
-            <a:pPr algn="ctr"/>
-            <a:endParaRPr lang="en-US">
-              <a:solidFill>
-                <a:prstClr val="white"/>
-              </a:solidFill>
-            </a:endParaRPr>
-          </a:p>
-        </p:txBody>
-      </p:sp>
-      <p:sp>
-        <p:nvSpPr>
-          <p:cNvPr id="7" name="Content Placeholder 1149"/>
-          <p:cNvSpPr txBox="1">
-            <a:spLocks/>
-          </p:cNvSpPr>
-          <p:nvPr/>
-        </p:nvSpPr>
-        <p:spPr>
-          <a:xfrm>
-            <a:off x="482600" y="1676400"/>
-            <a:ext cx="5613400" cy="4419600"/>
-          </a:xfrm>
-          <a:prstGeom prst="rect">
-            <a:avLst/>
-          </a:prstGeom>
-          <a:gradFill flip="none" rotWithShape="1">
-            <a:gsLst>
-              <a:gs pos="66000">
-                <a:schemeClr val="bg1">
-                  <a:lumMod val="65000"/>
-                  <a:alpha val="0"/>
-                </a:schemeClr>
-              </a:gs>
-              <a:gs pos="100000">
-                <a:schemeClr val="bg1">
-                  <a:lumMod val="85000"/>
-                  <a:alpha val="86000"/>
-                </a:schemeClr>
-              </a:gs>
-            </a:gsLst>
-            <a:lin ang="5400000" scaled="1"/>
-            <a:tileRect/>
-          </a:gradFill>
-          <a:effectLst/>
-        </p:spPr>
-        <p:txBody>
-          <a:bodyPr vert="horz" lIns="91440" tIns="45720" rIns="91440" bIns="45720" rtlCol="0">
-            <a:normAutofit fontScale="92500"/>
-          </a:bodyPr>
-          <a:lstStyle>
-            <a:lvl1pPr marL="342900" indent="-342900" algn="l" defTabSz="914400" rtl="0" eaLnBrk="1" latinLnBrk="0" hangingPunct="1">
-              <a:spcBef>
-                <a:spcPct val="20000"/>
-              </a:spcBef>
-              <a:buFont typeface="Arial" pitchFamily="34" charset="0"/>
-              <a:buChar char="•"/>
-              <a:defRPr sz="3200" kern="1200">
-                <a:solidFill>
-                  <a:schemeClr val="tx1"/>
-                </a:solidFill>
-                <a:latin typeface="+mn-lt"/>
-                <a:ea typeface="+mn-ea"/>
-                <a:cs typeface="+mn-cs"/>
-              </a:defRPr>
-            </a:lvl1pPr>
-            <a:lvl2pPr marL="742950" indent="-285750" algn="l" defTabSz="914400" rtl="0" eaLnBrk="1" latinLnBrk="0" hangingPunct="1">
-              <a:spcBef>
-                <a:spcPct val="20000"/>
-              </a:spcBef>
-              <a:buFont typeface="Arial" pitchFamily="34" charset="0"/>
-              <a:buChar char="–"/>
-              <a:defRPr sz="2800" kern="1200">
-                <a:solidFill>
-                  <a:schemeClr val="tx1"/>
-                </a:solidFill>
-                <a:latin typeface="+mn-lt"/>
-                <a:ea typeface="+mn-ea"/>
-                <a:cs typeface="+mn-cs"/>
-              </a:defRPr>
-            </a:lvl2pPr>
-            <a:lvl3pPr marL="1143000" indent="-228600" algn="l" defTabSz="914400" rtl="0" eaLnBrk="1" latinLnBrk="0" hangingPunct="1">
-              <a:spcBef>
-                <a:spcPct val="20000"/>
-              </a:spcBef>
-              <a:buFont typeface="Arial" pitchFamily="34" charset="0"/>
-              <a:buChar char="•"/>
-              <a:defRPr sz="2400" kern="1200">
-                <a:solidFill>
-                  <a:schemeClr val="tx1"/>
-                </a:solidFill>
-                <a:latin typeface="+mn-lt"/>
-                <a:ea typeface="+mn-ea"/>
-                <a:cs typeface="+mn-cs"/>
-              </a:defRPr>
-            </a:lvl3pPr>
-            <a:lvl4pPr marL="1600200" indent="-228600" algn="l" defTabSz="914400" rtl="0" eaLnBrk="1" latinLnBrk="0" hangingPunct="1">
-              <a:spcBef>
-                <a:spcPct val="20000"/>
-              </a:spcBef>
-              <a:buFont typeface="Arial" pitchFamily="34" charset="0"/>
-              <a:buChar char="–"/>
-              <a:defRPr sz="2000" kern="1200">
-                <a:solidFill>
-                  <a:schemeClr val="tx1"/>
-                </a:solidFill>
-                <a:latin typeface="+mn-lt"/>
-                <a:ea typeface="+mn-ea"/>
-                <a:cs typeface="+mn-cs"/>
-              </a:defRPr>
-            </a:lvl4pPr>
-            <a:lvl5pPr marL="2057400" indent="-228600" algn="l" defTabSz="914400" rtl="0" eaLnBrk="1" latinLnBrk="0" hangingPunct="1">
-              <a:spcBef>
-                <a:spcPct val="20000"/>
-              </a:spcBef>
-              <a:buFont typeface="Arial" pitchFamily="34" charset="0"/>
-              <a:buChar char="»"/>
-              <a:defRPr sz="2000" kern="1200">
-                <a:solidFill>
-                  <a:schemeClr val="tx1"/>
-                </a:solidFill>
-                <a:latin typeface="+mn-lt"/>
-                <a:ea typeface="+mn-ea"/>
-                <a:cs typeface="+mn-cs"/>
-              </a:defRPr>
-            </a:lvl5pPr>
-            <a:lvl6pPr marL="2514600" indent="-228600" algn="l" defTabSz="914400" rtl="0" eaLnBrk="1" latinLnBrk="0" hangingPunct="1">
-              <a:spcBef>
-                <a:spcPct val="20000"/>
-              </a:spcBef>
-              <a:buFont typeface="Arial" pitchFamily="34" charset="0"/>
-              <a:buChar char="•"/>
-              <a:defRPr sz="2000" kern="1200">
-                <a:solidFill>
-                  <a:schemeClr val="tx1"/>
-                </a:solidFill>
-                <a:latin typeface="+mn-lt"/>
-                <a:ea typeface="+mn-ea"/>
-                <a:cs typeface="+mn-cs"/>
-              </a:defRPr>
-            </a:lvl6pPr>
-            <a:lvl7pPr marL="2971800" indent="-228600" algn="l" defTabSz="914400" rtl="0" eaLnBrk="1" latinLnBrk="0" hangingPunct="1">
-              <a:spcBef>
-                <a:spcPct val="20000"/>
-              </a:spcBef>
-              <a:buFont typeface="Arial" pitchFamily="34" charset="0"/>
-              <a:buChar char="•"/>
-              <a:defRPr sz="2000" kern="1200">
-                <a:solidFill>
-                  <a:schemeClr val="tx1"/>
-                </a:solidFill>
-                <a:latin typeface="+mn-lt"/>
-                <a:ea typeface="+mn-ea"/>
-                <a:cs typeface="+mn-cs"/>
-              </a:defRPr>
-            </a:lvl7pPr>
-            <a:lvl8pPr marL="3429000" indent="-228600" algn="l" defTabSz="914400" rtl="0" eaLnBrk="1" latinLnBrk="0" hangingPunct="1">
-              <a:spcBef>
-                <a:spcPct val="20000"/>
-              </a:spcBef>
-              <a:buFont typeface="Arial" pitchFamily="34" charset="0"/>
-              <a:buChar char="•"/>
-              <a:defRPr sz="2000" kern="1200">
-                <a:solidFill>
-                  <a:schemeClr val="tx1"/>
-                </a:solidFill>
-                <a:latin typeface="+mn-lt"/>
-                <a:ea typeface="+mn-ea"/>
-                <a:cs typeface="+mn-cs"/>
-              </a:defRPr>
-            </a:lvl8pPr>
-            <a:lvl9pPr marL="3886200" indent="-228600" algn="l" defTabSz="914400" rtl="0" eaLnBrk="1" latinLnBrk="0" hangingPunct="1">
-              <a:spcBef>
-                <a:spcPct val="20000"/>
-              </a:spcBef>
-              <a:buFont typeface="Arial" pitchFamily="34" charset="0"/>
-              <a:buChar char="•"/>
-              <a:defRPr sz="2000" kern="1200">
-                <a:solidFill>
-                  <a:schemeClr val="tx1"/>
-                </a:solidFill>
-                <a:latin typeface="+mn-lt"/>
-                <a:ea typeface="+mn-ea"/>
-                <a:cs typeface="+mn-cs"/>
-              </a:defRPr>
-            </a:lvl9pPr>
-          </a:lstStyle>
-          <a:p>
-            <a:r>
-              <a:rPr lang="en-US" dirty="0" smtClean="0"/>
-              <a:t>Last Digit of a UPC</a:t>
-            </a:r>
-          </a:p>
-          <a:p>
-            <a:r>
-              <a:rPr lang="en-US" dirty="0" smtClean="0"/>
-              <a:t>Calculated from other digits by</a:t>
-            </a:r>
-            <a:endParaRPr lang="en-US" dirty="0"/>
-          </a:p>
-          <a:p>
-            <a:pPr lvl="1"/>
-            <a:r>
-              <a:rPr lang="en-US" dirty="0" smtClean="0"/>
-              <a:t>Adding odd digits, multiply by 3</a:t>
-            </a:r>
-          </a:p>
-          <a:p>
-            <a:pPr lvl="1"/>
-            <a:r>
-              <a:rPr lang="en-US" dirty="0" smtClean="0"/>
-              <a:t>Add even digits (excluding check digit)</a:t>
-            </a:r>
-          </a:p>
-          <a:p>
-            <a:pPr lvl="1"/>
-            <a:r>
-              <a:rPr lang="en-US" dirty="0" smtClean="0"/>
-              <a:t>Add the sums</a:t>
-            </a:r>
-          </a:p>
-          <a:p>
-            <a:pPr lvl="1"/>
-            <a:r>
-              <a:rPr lang="en-US" dirty="0" smtClean="0"/>
-              <a:t>Perform a modulo 10</a:t>
-            </a:r>
-          </a:p>
-          <a:p>
-            <a:pPr lvl="2"/>
-            <a:r>
-              <a:rPr lang="en-US" dirty="0" smtClean="0"/>
-              <a:t>If result is 0 check digit is 0</a:t>
-            </a:r>
-          </a:p>
-          <a:p>
-            <a:pPr lvl="2"/>
-            <a:r>
-              <a:rPr lang="en-US" dirty="0" smtClean="0"/>
-              <a:t>Else check digit should be 10 - result</a:t>
-            </a:r>
-          </a:p>
-        </p:txBody>
-      </p:sp>
-      <p:pic>
-        <p:nvPicPr>
-          <p:cNvPr id="3" name="Picture 2"/>
-          <p:cNvPicPr>
-            <a:picLocks noChangeAspect="1"/>
-          </p:cNvPicPr>
-          <p:nvPr/>
-        </p:nvPicPr>
-        <p:blipFill>
-          <a:blip r:embed="rId3">
-            <a:extLst>
-              <a:ext uri="{28A0092B-C50C-407E-A947-70E740481C1C}">
-                <a14:useLocalDpi xmlns:a14="http://schemas.microsoft.com/office/drawing/2010/main" val="0"/>
-              </a:ext>
-            </a:extLst>
-          </a:blip>
-          <a:stretch>
-            <a:fillRect/>
-          </a:stretch>
-        </p:blipFill>
-        <p:spPr>
-          <a:xfrm>
-            <a:off x="6464300" y="1676400"/>
-            <a:ext cx="2171700" cy="1819275"/>
-          </a:xfrm>
-          <a:prstGeom prst="rect">
-            <a:avLst/>
-          </a:prstGeom>
-        </p:spPr>
-      </p:pic>
-      <p:sp>
-        <p:nvSpPr>
-          <p:cNvPr id="4" name="TextBox 3"/>
-          <p:cNvSpPr txBox="1"/>
-          <p:nvPr/>
-        </p:nvSpPr>
-        <p:spPr>
-          <a:xfrm>
-            <a:off x="5257800" y="3886200"/>
-            <a:ext cx="3886200" cy="1200329"/>
-          </a:xfrm>
-          <a:prstGeom prst="rect">
-            <a:avLst/>
-          </a:prstGeom>
-          <a:noFill/>
-        </p:spPr>
-        <p:txBody>
-          <a:bodyPr wrap="square" rtlCol="0">
-            <a:spAutoFit/>
-          </a:bodyPr>
-          <a:lstStyle/>
-          <a:p>
-            <a:r>
-              <a:rPr lang="en-US" dirty="0" smtClean="0"/>
-              <a:t>Odd Sum: 5+3+0+1+6+0 </a:t>
-            </a:r>
-            <a:r>
-              <a:rPr lang="en-US" dirty="0"/>
-              <a:t>= </a:t>
-            </a:r>
-            <a:r>
-              <a:rPr lang="en-US" dirty="0" smtClean="0"/>
-              <a:t>15 * 3 </a:t>
-            </a:r>
-            <a:r>
-              <a:rPr lang="en-US" dirty="0"/>
-              <a:t>= 45</a:t>
-            </a:r>
-          </a:p>
-          <a:p>
-            <a:r>
-              <a:rPr lang="en-US" dirty="0" smtClean="0"/>
-              <a:t>Even Sum: 4+0+0+8+7 </a:t>
-            </a:r>
-            <a:r>
-              <a:rPr lang="en-US" dirty="0"/>
-              <a:t>= 19</a:t>
-            </a:r>
-          </a:p>
-          <a:p>
-            <a:r>
-              <a:rPr lang="en-US" dirty="0" smtClean="0"/>
-              <a:t>Sum Mod 10: 45+19 </a:t>
-            </a:r>
-            <a:r>
-              <a:rPr lang="en-US" dirty="0"/>
-              <a:t>= </a:t>
-            </a:r>
-            <a:r>
-              <a:rPr lang="en-US" dirty="0" smtClean="0"/>
-              <a:t>64 % 10 = 4</a:t>
-            </a:r>
-            <a:endParaRPr lang="en-US" dirty="0"/>
-          </a:p>
-          <a:p>
-            <a:r>
-              <a:rPr lang="en-US" dirty="0" smtClean="0"/>
-              <a:t>Check Digit: 10 – 4 = 6</a:t>
-            </a:r>
-            <a:endParaRPr lang="en-US" dirty="0"/>
-          </a:p>
-        </p:txBody>
-      </p:sp>
-    </p:spTree>
-    <p:extLst>
-      <p:ext uri="{BB962C8B-B14F-4D97-AF65-F5344CB8AC3E}">
-        <p14:creationId xmlns:p14="http://schemas.microsoft.com/office/powerpoint/2010/main" val="2096951698"/>
-      </p:ext>
-    </p:extLst>
-  </p:cSld>
-  <p:clrMapOvr>
-    <a:masterClrMapping/>
-  </p:clrMapOvr>
-  <p:timing>
-    <p:tnLst>
-      <p:par>
-        <p:cTn id="1" dur="indefinite" restart="never" nodeType="tmRoot">
-          <p:childTnLst>
-            <p:seq concurrent="1" nextAc="seek">
-              <p:cTn id="2" dur="indefinite" nodeType="mainSeq">
-                <p:childTnLst>
-                  <p:par>
-                    <p:cTn id="3" fill="hold">
-                      <p:stCondLst>
-                        <p:cond delay="indefinite"/>
-                      </p:stCondLst>
-                      <p:childTnLst>
-                        <p:par>
-                          <p:cTn id="4" fill="hold">
-                            <p:stCondLst>
-                              <p:cond delay="0"/>
-                            </p:stCondLst>
-                            <p:childTnLst>
-                              <p:par>
-                                <p:cTn id="5" presetID="10" presetClass="entr" presetSubtype="0" fill="hold" grpId="0" nodeType="clickEffect">
-                                  <p:stCondLst>
-                                    <p:cond delay="0"/>
-                                  </p:stCondLst>
-                                  <p:childTnLst>
-                                    <p:set>
-                                      <p:cBhvr>
-                                        <p:cTn id="6" dur="1" fill="hold">
-                                          <p:stCondLst>
-                                            <p:cond delay="0"/>
-                                          </p:stCondLst>
-                                        </p:cTn>
-                                        <p:tgtEl>
-                                          <p:spTgt spid="4"/>
-                                        </p:tgtEl>
-                                        <p:attrNameLst>
-                                          <p:attrName>style.visibility</p:attrName>
-                                        </p:attrNameLst>
-                                      </p:cBhvr>
-                                      <p:to>
-                                        <p:strVal val="visible"/>
-                                      </p:to>
-                                    </p:set>
-                                    <p:animEffect transition="in" filter="fade">
-                                      <p:cBhvr>
-                                        <p:cTn id="7" dur="500"/>
-                                        <p:tgtEl>
-                                          <p:spTgt spid="4"/>
-                                        </p:tgtEl>
-                                      </p:cBhvr>
-                                    </p:animEffect>
-                                  </p:childTnLst>
-                                </p:cTn>
-                              </p:par>
-                            </p:childTnLst>
-                          </p:cTn>
-                        </p:par>
-                      </p:childTnLst>
-                    </p:cTn>
-                  </p:par>
-                </p:childTnLst>
-              </p:cTn>
-              <p:prevCondLst>
-                <p:cond evt="onPrev" delay="0">
-                  <p:tgtEl>
-                    <p:sldTgt/>
-                  </p:tgtEl>
-                </p:cond>
-              </p:prevCondLst>
-              <p:nextCondLst>
-                <p:cond evt="onNext" delay="0">
-                  <p:tgtEl>
-                    <p:sldTgt/>
-                  </p:tgtEl>
-                </p:cond>
-              </p:nextCondLst>
-            </p:seq>
-          </p:childTnLst>
-        </p:cTn>
-      </p:par>
-    </p:tnLst>
-    <p:bldLst>
-      <p:bldP spid="4" grpId="0"/>
-    </p:bldLst>
-  </p:timing>
-</p:sld>
-</file>
-
 <file path=ppt/theme/theme1.xml><?xml version="1.0" encoding="utf-8"?>
 <a:theme xmlns:a="http://schemas.openxmlformats.org/drawingml/2006/main" name="Office Theme">
   <a:themeElements>

</xml_diff>

<commit_message>
Adding the final write-up.
</commit_message>
<xml_diff>
--- a/src/docs/Presentation/Got Movie Presentation.pptx
+++ b/src/docs/Presentation/Got Movie Presentation.pptx
@@ -526,14 +526,6 @@
           <a:bodyPr/>
           <a:lstStyle/>
           <a:p>
-            <a:r>
-              <a:rPr lang="en-US" dirty="0" smtClean="0"/>
-              <a:t>Server Sync was an ambitious</a:t>
-            </a:r>
-            <a:r>
-              <a:rPr lang="en-US" baseline="0" dirty="0" smtClean="0"/>
-              <a:t> goal.</a:t>
-            </a:r>
             <a:endParaRPr lang="en-US" dirty="0"/>
           </a:p>
         </p:txBody>
@@ -635,124 +627,6 @@
               <a:tabLst/>
               <a:defRPr/>
             </a:pPr>
-            <a:r>
-              <a:rPr lang="en-US" sz="1200" b="1" i="0" kern="1200" dirty="0" smtClean="0">
-                <a:solidFill>
-                  <a:schemeClr val="tx1"/>
-                </a:solidFill>
-                <a:effectLst/>
-                <a:latin typeface="+mn-lt"/>
-                <a:ea typeface="+mn-ea"/>
-                <a:cs typeface="+mn-cs"/>
-              </a:rPr>
-              <a:t>Number System</a:t>
-            </a:r>
-          </a:p>
-          <a:p>
-            <a:pPr marL="0" marR="0" indent="0" algn="l" defTabSz="914400" rtl="0" eaLnBrk="1" fontAlgn="auto" latinLnBrk="0" hangingPunct="1">
-              <a:lnSpc>
-                <a:spcPct val="100000"/>
-              </a:lnSpc>
-              <a:spcBef>
-                <a:spcPts val="0"/>
-              </a:spcBef>
-              <a:spcAft>
-                <a:spcPts val="0"/>
-              </a:spcAft>
-              <a:buClrTx/>
-              <a:buSzTx/>
-              <a:buFontTx/>
-              <a:buNone/>
-              <a:tabLst/>
-              <a:defRPr/>
-            </a:pPr>
-            <a:r>
-              <a:rPr lang="en-US" sz="1200" b="0" i="0" kern="1200" dirty="0" smtClean="0">
-                <a:solidFill>
-                  <a:schemeClr val="tx1"/>
-                </a:solidFill>
-                <a:effectLst/>
-                <a:latin typeface="+mn-lt"/>
-                <a:ea typeface="+mn-ea"/>
-                <a:cs typeface="+mn-cs"/>
-              </a:rPr>
-              <a:t>0</a:t>
-            </a:r>
-            <a:r>
-              <a:rPr lang="en-US" sz="1200" b="1" i="0" kern="1200" dirty="0" smtClean="0">
-                <a:solidFill>
-                  <a:schemeClr val="tx1"/>
-                </a:solidFill>
-                <a:effectLst/>
-                <a:latin typeface="+mn-lt"/>
-                <a:ea typeface="+mn-ea"/>
-                <a:cs typeface="+mn-cs"/>
-              </a:rPr>
-              <a:t> </a:t>
-            </a:r>
-            <a:r>
-              <a:rPr lang="en-US" sz="1200" b="0" i="0" kern="1200" dirty="0" smtClean="0">
-                <a:solidFill>
-                  <a:schemeClr val="tx1"/>
-                </a:solidFill>
-                <a:effectLst/>
-                <a:latin typeface="+mn-lt"/>
-                <a:ea typeface="+mn-ea"/>
-                <a:cs typeface="+mn-cs"/>
-              </a:rPr>
-              <a:t>Regular UPC codes</a:t>
-            </a:r>
-          </a:p>
-          <a:p>
-            <a:r>
-              <a:rPr lang="en-US" dirty="0" smtClean="0"/>
-              <a:t>3 Drug/Health related</a:t>
-            </a:r>
-          </a:p>
-          <a:p>
-            <a:r>
-              <a:rPr lang="en-US" dirty="0" smtClean="0"/>
-              <a:t>5 Coupons </a:t>
-            </a:r>
-          </a:p>
-          <a:p>
-            <a:r>
-              <a:rPr lang="en-US" dirty="0" smtClean="0"/>
-              <a:t>7 Regular UPC codes</a:t>
-            </a:r>
-          </a:p>
-          <a:p>
-            <a:endParaRPr lang="en-US" dirty="0" smtClean="0"/>
-          </a:p>
-          <a:p>
-            <a:r>
-              <a:rPr lang="en-US" dirty="0" smtClean="0"/>
-              <a:t>UCC = Uniform</a:t>
-            </a:r>
-            <a:r>
-              <a:rPr lang="en-US" baseline="0" dirty="0" smtClean="0"/>
-              <a:t> Code Council</a:t>
-            </a:r>
-          </a:p>
-          <a:p>
-            <a:r>
-              <a:rPr lang="en-US" baseline="0" dirty="0" smtClean="0"/>
-              <a:t>99,999 possible manufacturers per number system</a:t>
-            </a:r>
-          </a:p>
-          <a:p>
-            <a:r>
-              <a:rPr lang="en-US" baseline="0" dirty="0" smtClean="0"/>
-              <a:t>Not all manufacturers need 99,999 product codes. Variable length </a:t>
-            </a:r>
-            <a:r>
-              <a:rPr lang="en-US" baseline="0" dirty="0" err="1" smtClean="0"/>
-              <a:t>mfg</a:t>
-            </a:r>
-            <a:r>
-              <a:rPr lang="en-US" baseline="0" dirty="0" smtClean="0"/>
-              <a:t> codes = longer than 5 digits.</a:t>
-            </a:r>
             <a:endParaRPr lang="en-US" dirty="0"/>
           </a:p>
         </p:txBody>
@@ -1005,12 +879,6 @@
           <a:bodyPr/>
           <a:lstStyle/>
           <a:p>
-            <a:r>
-              <a:rPr lang="en-US" dirty="0" smtClean="0"/>
-              <a:t>Internal memory meaning the area it is stored on.</a:t>
-            </a:r>
-          </a:p>
-          <a:p>
             <a:endParaRPr lang="en-US" dirty="0"/>
           </a:p>
         </p:txBody>
@@ -1095,23 +963,6 @@
           <a:bodyPr/>
           <a:lstStyle/>
           <a:p>
-            <a:r>
-              <a:rPr lang="en-US" dirty="0" smtClean="0"/>
-              <a:t>Modified uses distance to find the valley instead of foreground/background weight values.</a:t>
-            </a:r>
-          </a:p>
-          <a:p>
-            <a:endParaRPr lang="en-US" dirty="0" smtClean="0"/>
-          </a:p>
-          <a:p>
-            <a:r>
-              <a:rPr lang="en-US" dirty="0" smtClean="0"/>
-              <a:t>Also had</a:t>
-            </a:r>
-            <a:r>
-              <a:rPr lang="en-US" baseline="0" dirty="0" smtClean="0"/>
-              <a:t> to apply a -1 4 -1 sharpen kernel to the row.</a:t>
-            </a:r>
             <a:endParaRPr lang="en-US" dirty="0"/>
           </a:p>
         </p:txBody>
@@ -1196,23 +1047,7 @@
           <a:bodyPr/>
           <a:lstStyle/>
           <a:p>
-            <a:r>
-              <a:rPr lang="en-US" dirty="0" smtClean="0"/>
-              <a:t>Containers much like </a:t>
-            </a:r>
-            <a:r>
-              <a:rPr lang="en-US" dirty="0" err="1" smtClean="0"/>
-              <a:t>jpanel’s</a:t>
-            </a:r>
-            <a:r>
-              <a:rPr lang="en-US" baseline="0" dirty="0" smtClean="0"/>
-              <a:t>. Combine them to make all kinds </a:t>
-            </a:r>
-            <a:r>
-              <a:rPr lang="en-US" baseline="0" smtClean="0"/>
-              <a:t>of screens.</a:t>
-            </a:r>
-            <a:endParaRPr lang="en-US" smtClean="0"/>
+            <a:endParaRPr lang="en-US" dirty="0" smtClean="0"/>
           </a:p>
         </p:txBody>
       </p:sp>
@@ -1296,31 +1131,6 @@
           <a:bodyPr/>
           <a:lstStyle/>
           <a:p>
-            <a:r>
-              <a:rPr lang="en-US" dirty="0" smtClean="0"/>
-              <a:t>Usage cost money</a:t>
-            </a:r>
-            <a:r>
-              <a:rPr lang="en-US" baseline="0" dirty="0" smtClean="0"/>
-              <a:t> after an </a:t>
-            </a:r>
-            <a:r>
-              <a:rPr lang="en-US" baseline="0" smtClean="0"/>
-              <a:t>initial phase.</a:t>
-            </a:r>
-          </a:p>
-          <a:p>
-            <a:endParaRPr lang="en-US" smtClean="0"/>
-          </a:p>
-          <a:p>
-            <a:r>
-              <a:rPr lang="en-US" dirty="0" smtClean="0"/>
-              <a:t>TOS – Usage</a:t>
-            </a:r>
-            <a:r>
-              <a:rPr lang="en-US" baseline="0" dirty="0" smtClean="0"/>
-              <a:t> of WS should bring business to Amazon</a:t>
-            </a:r>
             <a:endParaRPr lang="en-US" dirty="0"/>
           </a:p>
         </p:txBody>
@@ -1405,19 +1215,6 @@
           <a:bodyPr/>
           <a:lstStyle/>
           <a:p>
-            <a:r>
-              <a:rPr lang="en-US" dirty="0" smtClean="0"/>
-              <a:t>remote procedure call (RPC) protocol which uses XML to encode its calls and HTTP as a transport mechanism</a:t>
-            </a:r>
-          </a:p>
-          <a:p>
-            <a:endParaRPr lang="en-US" dirty="0" smtClean="0"/>
-          </a:p>
-          <a:p>
-            <a:r>
-              <a:rPr lang="en-US" dirty="0" smtClean="0"/>
-              <a:t>Series = TV shows, movie collections</a:t>
-            </a:r>
             <a:endParaRPr lang="en-US" dirty="0"/>
           </a:p>
         </p:txBody>

</xml_diff>